<commit_message>
added explanations for queries
</commit_message>
<xml_diff>
--- a/Docs/finalcis550project.pptx
+++ b/Docs/finalcis550project.pptx
@@ -121,6 +121,11 @@
       </a:defRPr>
     </a:lvl9pPr>
   </p:defaultTextStyle>
+  <p:extLst>
+    <p:ext uri="{EFAFB233-063F-42B5-8137-9DF3F51BA10A}">
+      <p15:sldGuideLst xmlns:p15="http://schemas.microsoft.com/office/powerpoint/2012/main"/>
+    </p:ext>
+  </p:extLst>
 </p:presentation>
 </file>
 
@@ -293,7 +298,7 @@
           <a:p>
             <a:fld id="{1160EA64-D806-43AC-9DF2-F8C432F32B4C}" type="datetimeFigureOut">
               <a:rPr lang="en-US" smtClean="0"/>
-              <a:t>12/10/21</a:t>
+              <a:t>12/11/2021</a:t>
             </a:fld>
             <a:endParaRPr lang="en-US" dirty="0"/>
           </a:p>
@@ -624,7 +629,7 @@
           <a:p>
             <a:fld id="{1160EA64-D806-43AC-9DF2-F8C432F32B4C}" type="datetimeFigureOut">
               <a:rPr lang="en-US" smtClean="0"/>
-              <a:t>12/10/21</a:t>
+              <a:t>12/11/2021</a:t>
             </a:fld>
             <a:endParaRPr lang="en-US" dirty="0"/>
           </a:p>
@@ -806,7 +811,7 @@
           <a:p>
             <a:fld id="{1160EA64-D806-43AC-9DF2-F8C432F32B4C}" type="datetimeFigureOut">
               <a:rPr lang="en-US" smtClean="0"/>
-              <a:t>12/10/21</a:t>
+              <a:t>12/11/2021</a:t>
             </a:fld>
             <a:endParaRPr lang="en-US" dirty="0"/>
           </a:p>
@@ -978,7 +983,7 @@
           <a:p>
             <a:fld id="{1160EA64-D806-43AC-9DF2-F8C432F32B4C}" type="datetimeFigureOut">
               <a:rPr lang="en-US" smtClean="0"/>
-              <a:t>12/10/21</a:t>
+              <a:t>12/11/2021</a:t>
             </a:fld>
             <a:endParaRPr lang="en-US" dirty="0"/>
           </a:p>
@@ -1257,7 +1262,7 @@
           <a:p>
             <a:fld id="{1160EA64-D806-43AC-9DF2-F8C432F32B4C}" type="datetimeFigureOut">
               <a:rPr lang="en-US" smtClean="0"/>
-              <a:t>12/10/21</a:t>
+              <a:t>12/11/2021</a:t>
             </a:fld>
             <a:endParaRPr lang="en-US" dirty="0"/>
           </a:p>
@@ -1652,7 +1657,7 @@
           <a:p>
             <a:fld id="{1160EA64-D806-43AC-9DF2-F8C432F32B4C}" type="datetimeFigureOut">
               <a:rPr lang="en-US" smtClean="0"/>
-              <a:t>12/10/21</a:t>
+              <a:t>12/11/2021</a:t>
             </a:fld>
             <a:endParaRPr lang="en-US" dirty="0"/>
           </a:p>
@@ -2131,7 +2136,7 @@
           <a:p>
             <a:fld id="{1160EA64-D806-43AC-9DF2-F8C432F32B4C}" type="datetimeFigureOut">
               <a:rPr lang="en-US" smtClean="0"/>
-              <a:t>12/10/21</a:t>
+              <a:t>12/11/2021</a:t>
             </a:fld>
             <a:endParaRPr lang="en-US" dirty="0"/>
           </a:p>
@@ -2251,7 +2256,7 @@
           <a:p>
             <a:fld id="{E1037C31-9E7A-4F99-8774-A0E530DE1A42}" type="datetimeFigureOut">
               <a:rPr lang="en-US" smtClean="0"/>
-              <a:t>12/10/21</a:t>
+              <a:t>12/11/2021</a:t>
             </a:fld>
             <a:endParaRPr lang="en-US" dirty="0"/>
           </a:p>
@@ -2346,7 +2351,7 @@
           <a:p>
             <a:fld id="{C278504F-A551-4DE0-9316-4DCD1D8CC752}" type="datetimeFigureOut">
               <a:rPr lang="en-US" smtClean="0"/>
-              <a:t>12/10/21</a:t>
+              <a:t>12/11/2021</a:t>
             </a:fld>
             <a:endParaRPr lang="en-US" dirty="0"/>
           </a:p>
@@ -2692,7 +2697,7 @@
           <a:p>
             <a:fld id="{1160EA64-D806-43AC-9DF2-F8C432F32B4C}" type="datetimeFigureOut">
               <a:rPr lang="en-US" smtClean="0"/>
-              <a:t>12/10/21</a:t>
+              <a:t>12/11/2021</a:t>
             </a:fld>
             <a:endParaRPr lang="en-US" dirty="0"/>
           </a:p>
@@ -3082,7 +3087,7 @@
           <a:p>
             <a:fld id="{042B0DB6-F5C7-45FB-8CF3-31B45F9C2DAC}" type="datetimeFigureOut">
               <a:rPr lang="en-US" smtClean="0"/>
-              <a:t>12/10/21</a:t>
+              <a:t>12/11/2021</a:t>
             </a:fld>
             <a:endParaRPr lang="en-US" dirty="0"/>
           </a:p>
@@ -3360,7 +3365,7 @@
           <a:p>
             <a:fld id="{1160EA64-D806-43AC-9DF2-F8C432F32B4C}" type="datetimeFigureOut">
               <a:rPr lang="en-US" smtClean="0"/>
-              <a:t>12/10/21</a:t>
+              <a:t>12/11/2021</a:t>
             </a:fld>
             <a:endParaRPr lang="en-US" dirty="0"/>
           </a:p>
@@ -5623,14 +5628,14 @@
             <p:ph idx="1"/>
             <p:extLst>
               <p:ext uri="{D42A27DB-BD31-4B8C-83A1-F6EECF244321}">
-                <p14:modId xmlns:p14="http://schemas.microsoft.com/office/powerpoint/2010/main" val="3537191699"/>
+                <p14:modId xmlns:p14="http://schemas.microsoft.com/office/powerpoint/2010/main" val="3804024664"/>
               </p:ext>
             </p:extLst>
           </p:nvPr>
         </p:nvGraphicFramePr>
         <p:xfrm>
-          <a:off x="2408663" y="0"/>
-          <a:ext cx="8831766" cy="6708076"/>
+          <a:off x="1103435" y="92319"/>
+          <a:ext cx="9908930" cy="6858000"/>
         </p:xfrm>
         <a:graphic>
           <a:graphicData uri="http://schemas.openxmlformats.org/drawingml/2006/table">
@@ -5639,7 +5644,7 @@
                 <a:tableStyleId>{5C22544A-7EE6-4342-B048-85BDC9FD1C3A}</a:tableStyleId>
               </a:tblPr>
               <a:tblGrid>
-                <a:gridCol w="8831766">
+                <a:gridCol w="9908930">
                   <a:extLst>
                     <a:ext uri="{9D8B030D-6E8A-4147-A177-3AD203B41FA5}">
                       <a16:colId xmlns:a16="http://schemas.microsoft.com/office/drawing/2014/main" val="3547208492"/>
@@ -5647,15 +5652,19 @@
                   </a:extLst>
                 </a:gridCol>
               </a:tblGrid>
-              <a:tr h="490156">
+              <a:tr h="459323">
                 <a:tc>
                   <a:txBody>
                     <a:bodyPr/>
                     <a:lstStyle/>
                     <a:p>
                       <a:r>
-                        <a:rPr lang="en-US" dirty="0"/>
-                        <a:t>Example 2:</a:t>
+                        <a:rPr lang="en-US" b="0" dirty="0"/>
+                        <a:t>Sentiment Query: </a:t>
+                      </a:r>
+                      <a:r>
+                        <a:rPr lang="en-US" b="1" dirty="0"/>
+                        <a:t>Returns sentiment and popularity values for a given company, as well as peers and the average of peers. This query is used on the Company Sentiment Page</a:t>
                       </a:r>
                     </a:p>
                   </a:txBody>
@@ -5667,7 +5676,7 @@
                   </a:ext>
                 </a:extLst>
               </a:tr>
-              <a:tr h="6063809">
+              <a:tr h="6126116">
                 <a:tc>
                   <a:txBody>
                     <a:bodyPr/>
@@ -6669,7 +6678,7 @@
             <p:ph idx="1"/>
             <p:extLst>
               <p:ext uri="{D42A27DB-BD31-4B8C-83A1-F6EECF244321}">
-                <p14:modId xmlns:p14="http://schemas.microsoft.com/office/powerpoint/2010/main" val="2440618522"/>
+                <p14:modId xmlns:p14="http://schemas.microsoft.com/office/powerpoint/2010/main" val="2077879032"/>
               </p:ext>
             </p:extLst>
           </p:nvPr>
@@ -6699,10 +6708,67 @@
                     <a:bodyPr/>
                     <a:lstStyle/>
                     <a:p>
-                      <a:r>
-                        <a:rPr lang="en-US" dirty="0"/>
-                        <a:t>Company Jobs:</a:t>
-                      </a:r>
+                      <a:pPr marL="0" marR="0" lvl="0" indent="0" algn="l" defTabSz="914400" rtl="0" eaLnBrk="1" fontAlgn="auto" latinLnBrk="0" hangingPunct="1">
+                        <a:lnSpc>
+                          <a:spcPct val="100000"/>
+                        </a:lnSpc>
+                        <a:spcBef>
+                          <a:spcPts val="0"/>
+                        </a:spcBef>
+                        <a:spcAft>
+                          <a:spcPts val="0"/>
+                        </a:spcAft>
+                        <a:buClrTx/>
+                        <a:buSzTx/>
+                        <a:buFontTx/>
+                        <a:buNone/>
+                        <a:tabLst/>
+                        <a:defRPr/>
+                      </a:pPr>
+                      <a:r>
+                        <a:rPr lang="en-US" b="0" dirty="0"/>
+                        <a:t>Company Jobs: </a:t>
+                      </a:r>
+                      <a:r>
+                        <a:rPr lang="en-US" sz="1800" b="1" kern="1200" dirty="0">
+                          <a:solidFill>
+                            <a:schemeClr val="lt1"/>
+                          </a:solidFill>
+                          <a:effectLst/>
+                          <a:latin typeface="+mn-lt"/>
+                          <a:ea typeface="+mn-ea"/>
+                          <a:cs typeface="+mn-cs"/>
+                        </a:rPr>
+                        <a:t>Returns the jobs which match the user entered parameters like industry, sector, company name, normal vs. internship, job rating, number of employees and job title. This query is utilized by the main </a:t>
+                      </a:r>
+                      <a:r>
+                        <a:rPr lang="en-US" sz="1800" b="1" kern="1200">
+                          <a:solidFill>
+                            <a:schemeClr val="lt1"/>
+                          </a:solidFill>
+                          <a:effectLst/>
+                          <a:latin typeface="+mn-lt"/>
+                          <a:ea typeface="+mn-ea"/>
+                          <a:cs typeface="+mn-cs"/>
+                        </a:rPr>
+                        <a:t>job search page</a:t>
+                      </a:r>
+                      <a:endParaRPr lang="en-US" sz="1800" b="1" kern="1200" dirty="0">
+                        <a:solidFill>
+                          <a:schemeClr val="lt1"/>
+                        </a:solidFill>
+                        <a:effectLst/>
+                        <a:latin typeface="+mn-lt"/>
+                        <a:ea typeface="+mn-ea"/>
+                        <a:cs typeface="+mn-cs"/>
+                      </a:endParaRPr>
+                    </a:p>
+                    <a:p>
+                      <a:r>
+                        <a:rPr lang="en-US" b="1" dirty="0"/>
+                        <a:t> </a:t>
+                      </a:r>
+                      <a:endParaRPr lang="en-US" b="0" dirty="0"/>
                     </a:p>
                   </a:txBody>
                   <a:tcPr/>

</xml_diff>

<commit_message>
Final changes to ppt
</commit_message>
<xml_diff>
--- a/Docs/finalcis550project.pptx
+++ b/Docs/finalcis550project.pptx
@@ -5,28 +5,29 @@
     <p:sldMasterId id="2147484200" r:id="rId1"/>
   </p:sldMasterIdLst>
   <p:notesMasterIdLst>
-    <p:notesMasterId r:id="rId21"/>
+    <p:notesMasterId r:id="rId22"/>
   </p:notesMasterIdLst>
   <p:sldIdLst>
     <p:sldId id="276" r:id="rId2"/>
     <p:sldId id="257" r:id="rId3"/>
     <p:sldId id="258" r:id="rId4"/>
     <p:sldId id="259" r:id="rId5"/>
-    <p:sldId id="271" r:id="rId6"/>
-    <p:sldId id="272" r:id="rId7"/>
-    <p:sldId id="268" r:id="rId8"/>
-    <p:sldId id="260" r:id="rId9"/>
-    <p:sldId id="269" r:id="rId10"/>
-    <p:sldId id="262" r:id="rId11"/>
-    <p:sldId id="264" r:id="rId12"/>
-    <p:sldId id="266" r:id="rId13"/>
-    <p:sldId id="274" r:id="rId14"/>
-    <p:sldId id="267" r:id="rId15"/>
-    <p:sldId id="275" r:id="rId16"/>
-    <p:sldId id="270" r:id="rId17"/>
-    <p:sldId id="265" r:id="rId18"/>
-    <p:sldId id="273" r:id="rId19"/>
-    <p:sldId id="261" r:id="rId20"/>
+    <p:sldId id="272" r:id="rId6"/>
+    <p:sldId id="268" r:id="rId7"/>
+    <p:sldId id="271" r:id="rId8"/>
+    <p:sldId id="277" r:id="rId9"/>
+    <p:sldId id="260" r:id="rId10"/>
+    <p:sldId id="269" r:id="rId11"/>
+    <p:sldId id="262" r:id="rId12"/>
+    <p:sldId id="264" r:id="rId13"/>
+    <p:sldId id="266" r:id="rId14"/>
+    <p:sldId id="274" r:id="rId15"/>
+    <p:sldId id="267" r:id="rId16"/>
+    <p:sldId id="275" r:id="rId17"/>
+    <p:sldId id="270" r:id="rId18"/>
+    <p:sldId id="265" r:id="rId19"/>
+    <p:sldId id="273" r:id="rId20"/>
+    <p:sldId id="261" r:id="rId21"/>
   </p:sldIdLst>
   <p:sldSz cx="12192000" cy="6858000"/>
   <p:notesSz cx="6858000" cy="9144000"/>
@@ -137,840 +138,57 @@
 <pc:chgInfo xmlns:a="http://schemas.openxmlformats.org/drawingml/2006/main" xmlns:r="http://schemas.openxmlformats.org/officeDocument/2006/relationships" xmlns:ac="http://schemas.microsoft.com/office/drawing/2013/main/command" xmlns:pc="http://schemas.microsoft.com/office/powerpoint/2013/main/command">
   <pc:docChgLst>
     <pc:chgData name="Shrivats Agrawal" userId="e5df348812f7d361" providerId="LiveId" clId="{2B6C14F9-B8D7-43B3-A9F9-F9BF1904CE9F}"/>
-    <pc:docChg chg="undo redo custSel addSld delSld modSld modMainMaster">
-      <pc:chgData name="Shrivats Agrawal" userId="e5df348812f7d361" providerId="LiveId" clId="{2B6C14F9-B8D7-43B3-A9F9-F9BF1904CE9F}" dt="2021-12-12T16:19:00.455" v="1257" actId="20577"/>
+    <pc:docChg chg="undo custSel modSld">
+      <pc:chgData name="Shrivats Agrawal" userId="e5df348812f7d361" providerId="LiveId" clId="{2B6C14F9-B8D7-43B3-A9F9-F9BF1904CE9F}" dt="2021-12-12T18:55:11.443" v="29" actId="20577"/>
       <pc:docMkLst>
         <pc:docMk/>
       </pc:docMkLst>
-      <pc:sldChg chg="addSp delSp modSp del mod">
-        <pc:chgData name="Shrivats Agrawal" userId="e5df348812f7d361" providerId="LiveId" clId="{2B6C14F9-B8D7-43B3-A9F9-F9BF1904CE9F}" dt="2021-12-12T15:56:03.054" v="939" actId="2696"/>
-        <pc:sldMkLst>
-          <pc:docMk/>
-          <pc:sldMk cId="853797005" sldId="256"/>
-        </pc:sldMkLst>
-        <pc:spChg chg="del">
-          <ac:chgData name="Shrivats Agrawal" userId="e5df348812f7d361" providerId="LiveId" clId="{2B6C14F9-B8D7-43B3-A9F9-F9BF1904CE9F}" dt="2021-12-12T15:50:53.572" v="699" actId="478"/>
-          <ac:spMkLst>
-            <pc:docMk/>
-            <pc:sldMk cId="853797005" sldId="256"/>
-            <ac:spMk id="3" creationId="{E67A9B6F-7F6D-F841-8354-D376F790BAFE}"/>
-          </ac:spMkLst>
-        </pc:spChg>
-        <pc:spChg chg="add">
-          <ac:chgData name="Shrivats Agrawal" userId="e5df348812f7d361" providerId="LiveId" clId="{2B6C14F9-B8D7-43B3-A9F9-F9BF1904CE9F}" dt="2021-12-12T15:51:42.372" v="700" actId="22"/>
-          <ac:spMkLst>
-            <pc:docMk/>
-            <pc:sldMk cId="853797005" sldId="256"/>
-            <ac:spMk id="5" creationId="{845F4FD9-6491-45CE-A576-22D12CF045C3}"/>
-          </ac:spMkLst>
-        </pc:spChg>
-        <pc:spChg chg="add">
-          <ac:chgData name="Shrivats Agrawal" userId="e5df348812f7d361" providerId="LiveId" clId="{2B6C14F9-B8D7-43B3-A9F9-F9BF1904CE9F}" dt="2021-12-12T15:51:47.791" v="701" actId="22"/>
-          <ac:spMkLst>
-            <pc:docMk/>
-            <pc:sldMk cId="853797005" sldId="256"/>
-            <ac:spMk id="7" creationId="{549279CB-29C3-46AF-9BB1-B3DFB3B23DB2}"/>
-          </ac:spMkLst>
-        </pc:spChg>
-        <pc:spChg chg="add mod">
-          <ac:chgData name="Shrivats Agrawal" userId="e5df348812f7d361" providerId="LiveId" clId="{2B6C14F9-B8D7-43B3-A9F9-F9BF1904CE9F}" dt="2021-12-12T15:51:54.796" v="703" actId="1076"/>
-          <ac:spMkLst>
-            <pc:docMk/>
-            <pc:sldMk cId="853797005" sldId="256"/>
-            <ac:spMk id="9" creationId="{A43055CA-FF30-4AAD-B74F-447CB3A57D5E}"/>
-          </ac:spMkLst>
-        </pc:spChg>
-      </pc:sldChg>
-      <pc:sldChg chg="modSp">
-        <pc:chgData name="Shrivats Agrawal" userId="e5df348812f7d361" providerId="LiveId" clId="{2B6C14F9-B8D7-43B3-A9F9-F9BF1904CE9F}" dt="2021-12-12T16:08:47.693" v="962"/>
-        <pc:sldMkLst>
-          <pc:docMk/>
-          <pc:sldMk cId="20330491" sldId="257"/>
-        </pc:sldMkLst>
-        <pc:spChg chg="mod">
-          <ac:chgData name="Shrivats Agrawal" userId="e5df348812f7d361" providerId="LiveId" clId="{2B6C14F9-B8D7-43B3-A9F9-F9BF1904CE9F}" dt="2021-12-12T16:08:47.693" v="962"/>
-          <ac:spMkLst>
-            <pc:docMk/>
-            <pc:sldMk cId="20330491" sldId="257"/>
-            <ac:spMk id="2" creationId="{0B590C09-9E4D-B045-A5C8-9ADFFD850697}"/>
-          </ac:spMkLst>
-        </pc:spChg>
-        <pc:spChg chg="mod">
-          <ac:chgData name="Shrivats Agrawal" userId="e5df348812f7d361" providerId="LiveId" clId="{2B6C14F9-B8D7-43B3-A9F9-F9BF1904CE9F}" dt="2021-12-12T16:08:47.693" v="962"/>
-          <ac:spMkLst>
-            <pc:docMk/>
-            <pc:sldMk cId="20330491" sldId="257"/>
-            <ac:spMk id="3" creationId="{94DCB4B0-F4DD-844D-AB9A-68F29DE05108}"/>
-          </ac:spMkLst>
-        </pc:spChg>
-      </pc:sldChg>
-      <pc:sldChg chg="modSp">
-        <pc:chgData name="Shrivats Agrawal" userId="e5df348812f7d361" providerId="LiveId" clId="{2B6C14F9-B8D7-43B3-A9F9-F9BF1904CE9F}" dt="2021-12-12T16:08:47.693" v="962"/>
+      <pc:sldChg chg="addSp delSp modSp mod">
+        <pc:chgData name="Shrivats Agrawal" userId="e5df348812f7d361" providerId="LiveId" clId="{2B6C14F9-B8D7-43B3-A9F9-F9BF1904CE9F}" dt="2021-12-12T18:54:26.256" v="10" actId="1076"/>
         <pc:sldMkLst>
           <pc:docMk/>
           <pc:sldMk cId="644453865" sldId="258"/>
         </pc:sldMkLst>
-        <pc:spChg chg="mod">
-          <ac:chgData name="Shrivats Agrawal" userId="e5df348812f7d361" providerId="LiveId" clId="{2B6C14F9-B8D7-43B3-A9F9-F9BF1904CE9F}" dt="2021-12-12T16:08:47.693" v="962"/>
-          <ac:spMkLst>
-            <pc:docMk/>
-            <pc:sldMk cId="644453865" sldId="258"/>
-            <ac:spMk id="2" creationId="{6A02296A-9641-4840-AE8E-3AEE2E008B41}"/>
-          </ac:spMkLst>
-        </pc:spChg>
-        <pc:spChg chg="mod">
-          <ac:chgData name="Shrivats Agrawal" userId="e5df348812f7d361" providerId="LiveId" clId="{2B6C14F9-B8D7-43B3-A9F9-F9BF1904CE9F}" dt="2021-12-12T16:08:47.693" v="962"/>
+        <pc:spChg chg="del">
+          <ac:chgData name="Shrivats Agrawal" userId="e5df348812f7d361" providerId="LiveId" clId="{2B6C14F9-B8D7-43B3-A9F9-F9BF1904CE9F}" dt="2021-12-12T18:54:14.923" v="7" actId="478"/>
           <ac:spMkLst>
             <pc:docMk/>
             <pc:sldMk cId="644453865" sldId="258"/>
             <ac:spMk id="3" creationId="{AB64C1AA-6A7F-6C4E-B1B7-A6665F428CFF}"/>
           </ac:spMkLst>
         </pc:spChg>
+        <pc:picChg chg="del mod">
+          <ac:chgData name="Shrivats Agrawal" userId="e5df348812f7d361" providerId="LiveId" clId="{2B6C14F9-B8D7-43B3-A9F9-F9BF1904CE9F}" dt="2021-12-12T18:53:59.821" v="1" actId="478"/>
+          <ac:picMkLst>
+            <pc:docMk/>
+            <pc:sldMk cId="644453865" sldId="258"/>
+            <ac:picMk id="5" creationId="{877B2B5B-7222-D746-8B21-4BE294D193A9}"/>
+          </ac:picMkLst>
+        </pc:picChg>
+        <pc:picChg chg="add mod">
+          <ac:chgData name="Shrivats Agrawal" userId="e5df348812f7d361" providerId="LiveId" clId="{2B6C14F9-B8D7-43B3-A9F9-F9BF1904CE9F}" dt="2021-12-12T18:54:26.256" v="10" actId="1076"/>
+          <ac:picMkLst>
+            <pc:docMk/>
+            <pc:sldMk cId="644453865" sldId="258"/>
+            <ac:picMk id="6" creationId="{36FBEE7E-E19B-4B76-8D15-2A1D01689C5B}"/>
+          </ac:picMkLst>
+        </pc:picChg>
       </pc:sldChg>
-      <pc:sldChg chg="addSp delSp modSp mod setBg modClrScheme delDesignElem chgLayout">
-        <pc:chgData name="Shrivats Agrawal" userId="e5df348812f7d361" providerId="LiveId" clId="{2B6C14F9-B8D7-43B3-A9F9-F9BF1904CE9F}" dt="2021-12-12T16:09:46.876" v="970"/>
+      <pc:sldChg chg="modSp mod">
+        <pc:chgData name="Shrivats Agrawal" userId="e5df348812f7d361" providerId="LiveId" clId="{2B6C14F9-B8D7-43B3-A9F9-F9BF1904CE9F}" dt="2021-12-12T18:55:11.443" v="29" actId="20577"/>
         <pc:sldMkLst>
           <pc:docMk/>
           <pc:sldMk cId="501812669" sldId="259"/>
         </pc:sldMkLst>
-        <pc:spChg chg="mod ord">
-          <ac:chgData name="Shrivats Agrawal" userId="e5df348812f7d361" providerId="LiveId" clId="{2B6C14F9-B8D7-43B3-A9F9-F9BF1904CE9F}" dt="2021-12-12T16:09:24.562" v="964" actId="700"/>
-          <ac:spMkLst>
-            <pc:docMk/>
-            <pc:sldMk cId="501812669" sldId="259"/>
-            <ac:spMk id="2" creationId="{A2DD5DA9-F601-3944-9D2B-DFE732B2EDED}"/>
-          </ac:spMkLst>
-        </pc:spChg>
-        <pc:spChg chg="mod ord">
-          <ac:chgData name="Shrivats Agrawal" userId="e5df348812f7d361" providerId="LiveId" clId="{2B6C14F9-B8D7-43B3-A9F9-F9BF1904CE9F}" dt="2021-12-12T16:09:24.562" v="964" actId="700"/>
+        <pc:spChg chg="mod">
+          <ac:chgData name="Shrivats Agrawal" userId="e5df348812f7d361" providerId="LiveId" clId="{2B6C14F9-B8D7-43B3-A9F9-F9BF1904CE9F}" dt="2021-12-12T18:55:11.443" v="29" actId="20577"/>
           <ac:spMkLst>
             <pc:docMk/>
             <pc:sldMk cId="501812669" sldId="259"/>
             <ac:spMk id="3" creationId="{98D12DB3-608C-3341-A30F-5483B91E81F7}"/>
           </ac:spMkLst>
         </pc:spChg>
-        <pc:spChg chg="add del">
-          <ac:chgData name="Shrivats Agrawal" userId="e5df348812f7d361" providerId="LiveId" clId="{2B6C14F9-B8D7-43B3-A9F9-F9BF1904CE9F}" dt="2021-12-12T16:08:47.693" v="962"/>
-          <ac:spMkLst>
-            <pc:docMk/>
-            <pc:sldMk cId="501812669" sldId="259"/>
-            <ac:spMk id="9" creationId="{B9F89C22-0475-4427-B7C8-0269AD40E3EC}"/>
-          </ac:spMkLst>
-        </pc:spChg>
       </pc:sldChg>
-      <pc:sldChg chg="addSp delSp modSp mod setBg modClrScheme delDesignElem chgLayout">
-        <pc:chgData name="Shrivats Agrawal" userId="e5df348812f7d361" providerId="LiveId" clId="{2B6C14F9-B8D7-43B3-A9F9-F9BF1904CE9F}" dt="2021-12-12T16:10:34.812" v="987" actId="20577"/>
-        <pc:sldMkLst>
-          <pc:docMk/>
-          <pc:sldMk cId="1891111787" sldId="260"/>
-        </pc:sldMkLst>
-        <pc:spChg chg="add mod ord">
-          <ac:chgData name="Shrivats Agrawal" userId="e5df348812f7d361" providerId="LiveId" clId="{2B6C14F9-B8D7-43B3-A9F9-F9BF1904CE9F}" dt="2021-12-12T16:10:34.812" v="987" actId="20577"/>
-          <ac:spMkLst>
-            <pc:docMk/>
-            <pc:sldMk cId="1891111787" sldId="260"/>
-            <ac:spMk id="2" creationId="{F7FD50C5-538B-4D77-8ADF-FD442EDBDDC9}"/>
-          </ac:spMkLst>
-        </pc:spChg>
-        <pc:spChg chg="add mod ord">
-          <ac:chgData name="Shrivats Agrawal" userId="e5df348812f7d361" providerId="LiveId" clId="{2B6C14F9-B8D7-43B3-A9F9-F9BF1904CE9F}" dt="2021-12-12T16:10:29.705" v="977" actId="700"/>
-          <ac:spMkLst>
-            <pc:docMk/>
-            <pc:sldMk cId="1891111787" sldId="260"/>
-            <ac:spMk id="3" creationId="{CAB06A35-9000-44D7-B426-A4789D704D19}"/>
-          </ac:spMkLst>
-        </pc:spChg>
-        <pc:spChg chg="add del">
-          <ac:chgData name="Shrivats Agrawal" userId="e5df348812f7d361" providerId="LiveId" clId="{2B6C14F9-B8D7-43B3-A9F9-F9BF1904CE9F}" dt="2021-12-12T16:08:47.693" v="962"/>
-          <ac:spMkLst>
-            <pc:docMk/>
-            <pc:sldMk cId="1891111787" sldId="260"/>
-            <ac:spMk id="9" creationId="{AA6EC888-B85F-410F-B430-06583E94BEEC}"/>
-          </ac:spMkLst>
-        </pc:spChg>
-        <pc:spChg chg="add del">
-          <ac:chgData name="Shrivats Agrawal" userId="e5df348812f7d361" providerId="LiveId" clId="{2B6C14F9-B8D7-43B3-A9F9-F9BF1904CE9F}" dt="2021-12-12T16:08:47.693" v="962"/>
-          <ac:spMkLst>
-            <pc:docMk/>
-            <pc:sldMk cId="1891111787" sldId="260"/>
-            <ac:spMk id="11" creationId="{9485DA84-CB73-4E5E-9864-2460CE28055D}"/>
-          </ac:spMkLst>
-        </pc:spChg>
-        <pc:spChg chg="add del">
-          <ac:chgData name="Shrivats Agrawal" userId="e5df348812f7d361" providerId="LiveId" clId="{2B6C14F9-B8D7-43B3-A9F9-F9BF1904CE9F}" dt="2021-12-12T16:08:47.693" v="962"/>
-          <ac:spMkLst>
-            <pc:docMk/>
-            <pc:sldMk cId="1891111787" sldId="260"/>
-            <ac:spMk id="13" creationId="{7D49185E-361A-421B-8F2D-11C7FFC686F0}"/>
-          </ac:spMkLst>
-        </pc:spChg>
-        <pc:spChg chg="add del">
-          <ac:chgData name="Shrivats Agrawal" userId="e5df348812f7d361" providerId="LiveId" clId="{2B6C14F9-B8D7-43B3-A9F9-F9BF1904CE9F}" dt="2021-12-12T16:08:47.693" v="962"/>
-          <ac:spMkLst>
-            <pc:docMk/>
-            <pc:sldMk cId="1891111787" sldId="260"/>
-            <ac:spMk id="15" creationId="{14B85BAA-C37F-44B4-B427-B4F10EBB4183}"/>
-          </ac:spMkLst>
-        </pc:spChg>
-        <pc:spChg chg="add del">
-          <ac:chgData name="Shrivats Agrawal" userId="e5df348812f7d361" providerId="LiveId" clId="{2B6C14F9-B8D7-43B3-A9F9-F9BF1904CE9F}" dt="2021-12-12T16:08:47.693" v="962"/>
-          <ac:spMkLst>
-            <pc:docMk/>
-            <pc:sldMk cId="1891111787" sldId="260"/>
-            <ac:spMk id="17" creationId="{EDC4EE06-D7B4-4FAC-A561-38A1C380232A}"/>
-          </ac:spMkLst>
-        </pc:spChg>
-        <pc:spChg chg="add del">
-          <ac:chgData name="Shrivats Agrawal" userId="e5df348812f7d361" providerId="LiveId" clId="{2B6C14F9-B8D7-43B3-A9F9-F9BF1904CE9F}" dt="2021-12-12T16:08:47.693" v="962"/>
-          <ac:spMkLst>
-            <pc:docMk/>
-            <pc:sldMk cId="1891111787" sldId="260"/>
-            <ac:spMk id="19" creationId="{9018D83B-903C-4782-B1BB-A45164A71F60}"/>
-          </ac:spMkLst>
-        </pc:spChg>
-        <pc:spChg chg="add del">
-          <ac:chgData name="Shrivats Agrawal" userId="e5df348812f7d361" providerId="LiveId" clId="{2B6C14F9-B8D7-43B3-A9F9-F9BF1904CE9F}" dt="2021-12-12T16:08:47.693" v="962"/>
-          <ac:spMkLst>
-            <pc:docMk/>
-            <pc:sldMk cId="1891111787" sldId="260"/>
-            <ac:spMk id="21" creationId="{8785589A-A5AC-409A-B2A2-24D871B4CEF0}"/>
-          </ac:spMkLst>
-        </pc:spChg>
-        <pc:picChg chg="mod ord">
-          <ac:chgData name="Shrivats Agrawal" userId="e5df348812f7d361" providerId="LiveId" clId="{2B6C14F9-B8D7-43B3-A9F9-F9BF1904CE9F}" dt="2021-12-12T16:10:29.705" v="977" actId="700"/>
-          <ac:picMkLst>
-            <pc:docMk/>
-            <pc:sldMk cId="1891111787" sldId="260"/>
-            <ac:picMk id="4" creationId="{1916AF0B-1E20-E646-BB26-ADC26B338FD6}"/>
-          </ac:picMkLst>
-        </pc:picChg>
-      </pc:sldChg>
-      <pc:sldChg chg="addSp delSp setBg delDesignElem">
-        <pc:chgData name="Shrivats Agrawal" userId="e5df348812f7d361" providerId="LiveId" clId="{2B6C14F9-B8D7-43B3-A9F9-F9BF1904CE9F}" dt="2021-12-12T16:09:46.876" v="970"/>
-        <pc:sldMkLst>
-          <pc:docMk/>
-          <pc:sldMk cId="2854166306" sldId="261"/>
-        </pc:sldMkLst>
-        <pc:spChg chg="add del">
-          <ac:chgData name="Shrivats Agrawal" userId="e5df348812f7d361" providerId="LiveId" clId="{2B6C14F9-B8D7-43B3-A9F9-F9BF1904CE9F}" dt="2021-12-12T16:08:47.693" v="962"/>
-          <ac:spMkLst>
-            <pc:docMk/>
-            <pc:sldMk cId="2854166306" sldId="261"/>
-            <ac:spMk id="13" creationId="{F33867FC-EB8E-4B00-B7D5-7967D9DF1C62}"/>
-          </ac:spMkLst>
-        </pc:spChg>
-        <pc:spChg chg="add del">
-          <ac:chgData name="Shrivats Agrawal" userId="e5df348812f7d361" providerId="LiveId" clId="{2B6C14F9-B8D7-43B3-A9F9-F9BF1904CE9F}" dt="2021-12-12T16:08:47.693" v="962"/>
-          <ac:spMkLst>
-            <pc:docMk/>
-            <pc:sldMk cId="2854166306" sldId="261"/>
-            <ac:spMk id="15" creationId="{D69E00ED-B0F1-4570-A74E-E05D0E9A86C9}"/>
-          </ac:spMkLst>
-        </pc:spChg>
-        <pc:spChg chg="add del">
-          <ac:chgData name="Shrivats Agrawal" userId="e5df348812f7d361" providerId="LiveId" clId="{2B6C14F9-B8D7-43B3-A9F9-F9BF1904CE9F}" dt="2021-12-12T16:08:47.693" v="962"/>
-          <ac:spMkLst>
-            <pc:docMk/>
-            <pc:sldMk cId="2854166306" sldId="261"/>
-            <ac:spMk id="17" creationId="{074D0BE7-DDD8-46AB-A2C1-5B7FFD921AE2}"/>
-          </ac:spMkLst>
-        </pc:spChg>
-        <pc:grpChg chg="add del">
-          <ac:chgData name="Shrivats Agrawal" userId="e5df348812f7d361" providerId="LiveId" clId="{2B6C14F9-B8D7-43B3-A9F9-F9BF1904CE9F}" dt="2021-12-12T16:08:47.693" v="962"/>
-          <ac:grpSpMkLst>
-            <pc:docMk/>
-            <pc:sldMk cId="2854166306" sldId="261"/>
-            <ac:grpSpMk id="9" creationId="{9D9D6BF1-DFF2-4526-9D13-BF339D8C4163}"/>
-          </ac:grpSpMkLst>
-        </pc:grpChg>
-      </pc:sldChg>
-      <pc:sldChg chg="addSp delSp modSp mod">
-        <pc:chgData name="Shrivats Agrawal" userId="e5df348812f7d361" providerId="LiveId" clId="{2B6C14F9-B8D7-43B3-A9F9-F9BF1904CE9F}" dt="2021-12-12T16:12:34.837" v="1029" actId="12385"/>
-        <pc:sldMkLst>
-          <pc:docMk/>
-          <pc:sldMk cId="3764653813" sldId="262"/>
-        </pc:sldMkLst>
-        <pc:spChg chg="mod">
-          <ac:chgData name="Shrivats Agrawal" userId="e5df348812f7d361" providerId="LiveId" clId="{2B6C14F9-B8D7-43B3-A9F9-F9BF1904CE9F}" dt="2021-12-12T16:11:39.950" v="1018" actId="20577"/>
-          <ac:spMkLst>
-            <pc:docMk/>
-            <pc:sldMk cId="3764653813" sldId="262"/>
-            <ac:spMk id="2" creationId="{F6AF785F-ECB7-CC4B-A31F-2B88A3F01FA7}"/>
-          </ac:spMkLst>
-        </pc:spChg>
-        <pc:graphicFrameChg chg="add del mod modGraphic">
-          <ac:chgData name="Shrivats Agrawal" userId="e5df348812f7d361" providerId="LiveId" clId="{2B6C14F9-B8D7-43B3-A9F9-F9BF1904CE9F}" dt="2021-12-12T16:12:34.837" v="1029" actId="12385"/>
-          <ac:graphicFrameMkLst>
-            <pc:docMk/>
-            <pc:sldMk cId="3764653813" sldId="262"/>
-            <ac:graphicFrameMk id="4" creationId="{D8C6398D-E625-2646-85D4-7DBE5C0C0C4B}"/>
-          </ac:graphicFrameMkLst>
-        </pc:graphicFrameChg>
-      </pc:sldChg>
-      <pc:sldChg chg="modSp mod">
-        <pc:chgData name="Shrivats Agrawal" userId="e5df348812f7d361" providerId="LiveId" clId="{2B6C14F9-B8D7-43B3-A9F9-F9BF1904CE9F}" dt="2021-12-12T16:13:53.939" v="1086" actId="20577"/>
-        <pc:sldMkLst>
-          <pc:docMk/>
-          <pc:sldMk cId="1813232008" sldId="264"/>
-        </pc:sldMkLst>
-        <pc:spChg chg="mod">
-          <ac:chgData name="Shrivats Agrawal" userId="e5df348812f7d361" providerId="LiveId" clId="{2B6C14F9-B8D7-43B3-A9F9-F9BF1904CE9F}" dt="2021-12-12T16:13:53.939" v="1086" actId="20577"/>
-          <ac:spMkLst>
-            <pc:docMk/>
-            <pc:sldMk cId="1813232008" sldId="264"/>
-            <ac:spMk id="2" creationId="{5007D958-D4ED-8049-8817-E5E089507DD7}"/>
-          </ac:spMkLst>
-        </pc:spChg>
-        <pc:graphicFrameChg chg="mod modGraphic">
-          <ac:chgData name="Shrivats Agrawal" userId="e5df348812f7d361" providerId="LiveId" clId="{2B6C14F9-B8D7-43B3-A9F9-F9BF1904CE9F}" dt="2021-12-12T16:13:36.264" v="1044" actId="1076"/>
-          <ac:graphicFrameMkLst>
-            <pc:docMk/>
-            <pc:sldMk cId="1813232008" sldId="264"/>
-            <ac:graphicFrameMk id="4" creationId="{83885CF5-D0C5-6241-A616-87991E5376C8}"/>
-          </ac:graphicFrameMkLst>
-        </pc:graphicFrameChg>
-      </pc:sldChg>
-      <pc:sldChg chg="modSp mod">
-        <pc:chgData name="Shrivats Agrawal" userId="e5df348812f7d361" providerId="LiveId" clId="{2B6C14F9-B8D7-43B3-A9F9-F9BF1904CE9F}" dt="2021-12-12T16:08:47.773" v="963" actId="27636"/>
-        <pc:sldMkLst>
-          <pc:docMk/>
-          <pc:sldMk cId="3343210778" sldId="265"/>
-        </pc:sldMkLst>
-        <pc:spChg chg="mod">
-          <ac:chgData name="Shrivats Agrawal" userId="e5df348812f7d361" providerId="LiveId" clId="{2B6C14F9-B8D7-43B3-A9F9-F9BF1904CE9F}" dt="2021-12-12T16:08:47.693" v="962"/>
-          <ac:spMkLst>
-            <pc:docMk/>
-            <pc:sldMk cId="3343210778" sldId="265"/>
-            <ac:spMk id="2" creationId="{AC190585-BB9C-E04A-BC12-17CA7633B542}"/>
-          </ac:spMkLst>
-        </pc:spChg>
-        <pc:spChg chg="mod">
-          <ac:chgData name="Shrivats Agrawal" userId="e5df348812f7d361" providerId="LiveId" clId="{2B6C14F9-B8D7-43B3-A9F9-F9BF1904CE9F}" dt="2021-12-12T16:08:47.773" v="963" actId="27636"/>
-          <ac:spMkLst>
-            <pc:docMk/>
-            <pc:sldMk cId="3343210778" sldId="265"/>
-            <ac:spMk id="3" creationId="{2508D12E-F496-3840-BFFB-20E1A4C94403}"/>
-          </ac:spMkLst>
-        </pc:spChg>
-      </pc:sldChg>
-      <pc:sldChg chg="modSp mod">
-        <pc:chgData name="Shrivats Agrawal" userId="e5df348812f7d361" providerId="LiveId" clId="{2B6C14F9-B8D7-43B3-A9F9-F9BF1904CE9F}" dt="2021-12-12T16:14:56.076" v="1115" actId="20577"/>
-        <pc:sldMkLst>
-          <pc:docMk/>
-          <pc:sldMk cId="4277497038" sldId="266"/>
-        </pc:sldMkLst>
-        <pc:spChg chg="mod">
-          <ac:chgData name="Shrivats Agrawal" userId="e5df348812f7d361" providerId="LiveId" clId="{2B6C14F9-B8D7-43B3-A9F9-F9BF1904CE9F}" dt="2021-12-12T16:14:56.076" v="1115" actId="20577"/>
-          <ac:spMkLst>
-            <pc:docMk/>
-            <pc:sldMk cId="4277497038" sldId="266"/>
-            <ac:spMk id="2" creationId="{4CB8EAEC-2DCD-2B45-8123-41D950AA8DFD}"/>
-          </ac:spMkLst>
-        </pc:spChg>
-        <pc:graphicFrameChg chg="mod modGraphic">
-          <ac:chgData name="Shrivats Agrawal" userId="e5df348812f7d361" providerId="LiveId" clId="{2B6C14F9-B8D7-43B3-A9F9-F9BF1904CE9F}" dt="2021-12-12T16:14:40.752" v="1094" actId="1076"/>
-          <ac:graphicFrameMkLst>
-            <pc:docMk/>
-            <pc:sldMk cId="4277497038" sldId="266"/>
-            <ac:graphicFrameMk id="7" creationId="{618C9F98-9DC9-2246-9832-AC289B2CE604}"/>
-          </ac:graphicFrameMkLst>
-        </pc:graphicFrameChg>
-      </pc:sldChg>
-      <pc:sldChg chg="modSp mod">
-        <pc:chgData name="Shrivats Agrawal" userId="e5df348812f7d361" providerId="LiveId" clId="{2B6C14F9-B8D7-43B3-A9F9-F9BF1904CE9F}" dt="2021-12-12T16:15:32.457" v="1129" actId="1076"/>
-        <pc:sldMkLst>
-          <pc:docMk/>
-          <pc:sldMk cId="1684080500" sldId="267"/>
-        </pc:sldMkLst>
-        <pc:spChg chg="mod">
-          <ac:chgData name="Shrivats Agrawal" userId="e5df348812f7d361" providerId="LiveId" clId="{2B6C14F9-B8D7-43B3-A9F9-F9BF1904CE9F}" dt="2021-12-12T16:15:27.941" v="1128" actId="1076"/>
-          <ac:spMkLst>
-            <pc:docMk/>
-            <pc:sldMk cId="1684080500" sldId="267"/>
-            <ac:spMk id="2" creationId="{8B7C842F-8E53-E442-9BE6-2757A0FD06D8}"/>
-          </ac:spMkLst>
-        </pc:spChg>
-        <pc:graphicFrameChg chg="mod modGraphic">
-          <ac:chgData name="Shrivats Agrawal" userId="e5df348812f7d361" providerId="LiveId" clId="{2B6C14F9-B8D7-43B3-A9F9-F9BF1904CE9F}" dt="2021-12-12T16:15:32.457" v="1129" actId="1076"/>
-          <ac:graphicFrameMkLst>
-            <pc:docMk/>
-            <pc:sldMk cId="1684080500" sldId="267"/>
-            <ac:graphicFrameMk id="4" creationId="{DBD86A9B-262E-6B40-A008-BE08DC2377D4}"/>
-          </ac:graphicFrameMkLst>
-        </pc:graphicFrameChg>
-      </pc:sldChg>
-      <pc:sldChg chg="modSp mod">
-        <pc:chgData name="Shrivats Agrawal" userId="e5df348812f7d361" providerId="LiveId" clId="{2B6C14F9-B8D7-43B3-A9F9-F9BF1904CE9F}" dt="2021-12-12T16:08:47.693" v="962"/>
-        <pc:sldMkLst>
-          <pc:docMk/>
-          <pc:sldMk cId="3805460324" sldId="268"/>
-        </pc:sldMkLst>
-        <pc:spChg chg="mod">
-          <ac:chgData name="Shrivats Agrawal" userId="e5df348812f7d361" providerId="LiveId" clId="{2B6C14F9-B8D7-43B3-A9F9-F9BF1904CE9F}" dt="2021-12-12T16:08:47.693" v="962"/>
-          <ac:spMkLst>
-            <pc:docMk/>
-            <pc:sldMk cId="3805460324" sldId="268"/>
-            <ac:spMk id="2" creationId="{7028F658-3BA3-EE4F-AEDE-27B760EB142A}"/>
-          </ac:spMkLst>
-        </pc:spChg>
-        <pc:spChg chg="mod">
-          <ac:chgData name="Shrivats Agrawal" userId="e5df348812f7d361" providerId="LiveId" clId="{2B6C14F9-B8D7-43B3-A9F9-F9BF1904CE9F}" dt="2021-12-12T16:08:47.693" v="962"/>
-          <ac:spMkLst>
-            <pc:docMk/>
-            <pc:sldMk cId="3805460324" sldId="268"/>
-            <ac:spMk id="3" creationId="{616C6D97-515F-2547-A140-3E9A3901A606}"/>
-          </ac:spMkLst>
-        </pc:spChg>
-      </pc:sldChg>
-      <pc:sldChg chg="modSp mod">
-        <pc:chgData name="Shrivats Agrawal" userId="e5df348812f7d361" providerId="LiveId" clId="{2B6C14F9-B8D7-43B3-A9F9-F9BF1904CE9F}" dt="2021-12-12T16:11:06.282" v="999" actId="20577"/>
-        <pc:sldMkLst>
-          <pc:docMk/>
-          <pc:sldMk cId="4089964651" sldId="269"/>
-        </pc:sldMkLst>
-        <pc:spChg chg="mod">
-          <ac:chgData name="Shrivats Agrawal" userId="e5df348812f7d361" providerId="LiveId" clId="{2B6C14F9-B8D7-43B3-A9F9-F9BF1904CE9F}" dt="2021-12-12T16:08:47.693" v="962"/>
-          <ac:spMkLst>
-            <pc:docMk/>
-            <pc:sldMk cId="4089964651" sldId="269"/>
-            <ac:spMk id="2" creationId="{D7F2293B-D356-D445-A008-98E6F5C527FB}"/>
-          </ac:spMkLst>
-        </pc:spChg>
-        <pc:spChg chg="mod">
-          <ac:chgData name="Shrivats Agrawal" userId="e5df348812f7d361" providerId="LiveId" clId="{2B6C14F9-B8D7-43B3-A9F9-F9BF1904CE9F}" dt="2021-12-12T16:11:06.282" v="999" actId="20577"/>
-          <ac:spMkLst>
-            <pc:docMk/>
-            <pc:sldMk cId="4089964651" sldId="269"/>
-            <ac:spMk id="3" creationId="{66A6AB27-078A-EF46-ADD8-641E312C61F5}"/>
-          </ac:spMkLst>
-        </pc:spChg>
-      </pc:sldChg>
-      <pc:sldChg chg="modSp mod">
-        <pc:chgData name="Shrivats Agrawal" userId="e5df348812f7d361" providerId="LiveId" clId="{2B6C14F9-B8D7-43B3-A9F9-F9BF1904CE9F}" dt="2021-12-12T16:19:00.455" v="1257" actId="20577"/>
-        <pc:sldMkLst>
-          <pc:docMk/>
-          <pc:sldMk cId="2298100442" sldId="270"/>
-        </pc:sldMkLst>
-        <pc:spChg chg="mod">
-          <ac:chgData name="Shrivats Agrawal" userId="e5df348812f7d361" providerId="LiveId" clId="{2B6C14F9-B8D7-43B3-A9F9-F9BF1904CE9F}" dt="2021-12-12T16:08:47.693" v="962"/>
-          <ac:spMkLst>
-            <pc:docMk/>
-            <pc:sldMk cId="2298100442" sldId="270"/>
-            <ac:spMk id="2" creationId="{A297B044-2163-7046-B8DC-2420C168A897}"/>
-          </ac:spMkLst>
-        </pc:spChg>
-        <pc:graphicFrameChg chg="mod modGraphic">
-          <ac:chgData name="Shrivats Agrawal" userId="e5df348812f7d361" providerId="LiveId" clId="{2B6C14F9-B8D7-43B3-A9F9-F9BF1904CE9F}" dt="2021-12-12T16:19:00.455" v="1257" actId="20577"/>
-          <ac:graphicFrameMkLst>
-            <pc:docMk/>
-            <pc:sldMk cId="2298100442" sldId="270"/>
-            <ac:graphicFrameMk id="4" creationId="{E4AB7AEF-803F-B94E-AAB2-D2E684C7C10B}"/>
-          </ac:graphicFrameMkLst>
-        </pc:graphicFrameChg>
-      </pc:sldChg>
-      <pc:sldChg chg="modSp mod">
-        <pc:chgData name="Shrivats Agrawal" userId="e5df348812f7d361" providerId="LiveId" clId="{2B6C14F9-B8D7-43B3-A9F9-F9BF1904CE9F}" dt="2021-12-12T16:10:08.784" v="976" actId="20577"/>
-        <pc:sldMkLst>
-          <pc:docMk/>
-          <pc:sldMk cId="2020304711" sldId="271"/>
-        </pc:sldMkLst>
-        <pc:spChg chg="mod">
-          <ac:chgData name="Shrivats Agrawal" userId="e5df348812f7d361" providerId="LiveId" clId="{2B6C14F9-B8D7-43B3-A9F9-F9BF1904CE9F}" dt="2021-12-12T16:08:47.693" v="962"/>
-          <ac:spMkLst>
-            <pc:docMk/>
-            <pc:sldMk cId="2020304711" sldId="271"/>
-            <ac:spMk id="2" creationId="{FD470035-A329-954A-ADEE-4C382B535B42}"/>
-          </ac:spMkLst>
-        </pc:spChg>
-        <pc:spChg chg="mod">
-          <ac:chgData name="Shrivats Agrawal" userId="e5df348812f7d361" providerId="LiveId" clId="{2B6C14F9-B8D7-43B3-A9F9-F9BF1904CE9F}" dt="2021-12-12T16:10:08.784" v="976" actId="20577"/>
-          <ac:spMkLst>
-            <pc:docMk/>
-            <pc:sldMk cId="2020304711" sldId="271"/>
-            <ac:spMk id="3" creationId="{2B59C355-FE1A-2B48-A736-8E9E10F0077C}"/>
-          </ac:spMkLst>
-        </pc:spChg>
-      </pc:sldChg>
-      <pc:sldChg chg="modSp">
-        <pc:chgData name="Shrivats Agrawal" userId="e5df348812f7d361" providerId="LiveId" clId="{2B6C14F9-B8D7-43B3-A9F9-F9BF1904CE9F}" dt="2021-12-12T16:08:47.693" v="962"/>
-        <pc:sldMkLst>
-          <pc:docMk/>
-          <pc:sldMk cId="964039529" sldId="272"/>
-        </pc:sldMkLst>
-        <pc:spChg chg="mod">
-          <ac:chgData name="Shrivats Agrawal" userId="e5df348812f7d361" providerId="LiveId" clId="{2B6C14F9-B8D7-43B3-A9F9-F9BF1904CE9F}" dt="2021-12-12T16:08:47.693" v="962"/>
-          <ac:spMkLst>
-            <pc:docMk/>
-            <pc:sldMk cId="964039529" sldId="272"/>
-            <ac:spMk id="2" creationId="{9FA95BDB-F644-0345-80B8-7FFA1D5719BF}"/>
-          </ac:spMkLst>
-        </pc:spChg>
-        <pc:spChg chg="mod">
-          <ac:chgData name="Shrivats Agrawal" userId="e5df348812f7d361" providerId="LiveId" clId="{2B6C14F9-B8D7-43B3-A9F9-F9BF1904CE9F}" dt="2021-12-12T16:08:47.693" v="962"/>
-          <ac:spMkLst>
-            <pc:docMk/>
-            <pc:sldMk cId="964039529" sldId="272"/>
-            <ac:spMk id="3" creationId="{9BA3C526-4E18-754C-B40C-001934A18640}"/>
-          </ac:spMkLst>
-        </pc:spChg>
-      </pc:sldChg>
-      <pc:sldChg chg="modSp">
-        <pc:chgData name="Shrivats Agrawal" userId="e5df348812f7d361" providerId="LiveId" clId="{2B6C14F9-B8D7-43B3-A9F9-F9BF1904CE9F}" dt="2021-12-12T16:08:47.693" v="962"/>
-        <pc:sldMkLst>
-          <pc:docMk/>
-          <pc:sldMk cId="2302678304" sldId="273"/>
-        </pc:sldMkLst>
-        <pc:spChg chg="mod">
-          <ac:chgData name="Shrivats Agrawal" userId="e5df348812f7d361" providerId="LiveId" clId="{2B6C14F9-B8D7-43B3-A9F9-F9BF1904CE9F}" dt="2021-12-12T16:08:47.693" v="962"/>
-          <ac:spMkLst>
-            <pc:docMk/>
-            <pc:sldMk cId="2302678304" sldId="273"/>
-            <ac:spMk id="2" creationId="{9DBBEA84-112D-9E4D-BDEF-ADA2376CA6B1}"/>
-          </ac:spMkLst>
-        </pc:spChg>
-        <pc:spChg chg="mod">
-          <ac:chgData name="Shrivats Agrawal" userId="e5df348812f7d361" providerId="LiveId" clId="{2B6C14F9-B8D7-43B3-A9F9-F9BF1904CE9F}" dt="2021-12-12T16:08:47.693" v="962"/>
-          <ac:spMkLst>
-            <pc:docMk/>
-            <pc:sldMk cId="2302678304" sldId="273"/>
-            <ac:spMk id="3" creationId="{93A9789C-108D-AA4B-AA4B-33891E8F191D}"/>
-          </ac:spMkLst>
-        </pc:spChg>
-      </pc:sldChg>
-      <pc:sldChg chg="modSp mod">
-        <pc:chgData name="Shrivats Agrawal" userId="e5df348812f7d361" providerId="LiveId" clId="{2B6C14F9-B8D7-43B3-A9F9-F9BF1904CE9F}" dt="2021-12-12T16:15:12.578" v="1127" actId="20577"/>
-        <pc:sldMkLst>
-          <pc:docMk/>
-          <pc:sldMk cId="3466991620" sldId="274"/>
-        </pc:sldMkLst>
-        <pc:spChg chg="mod">
-          <ac:chgData name="Shrivats Agrawal" userId="e5df348812f7d361" providerId="LiveId" clId="{2B6C14F9-B8D7-43B3-A9F9-F9BF1904CE9F}" dt="2021-12-12T16:15:12.578" v="1127" actId="20577"/>
-          <ac:spMkLst>
-            <pc:docMk/>
-            <pc:sldMk cId="3466991620" sldId="274"/>
-            <ac:spMk id="2" creationId="{117B7F2B-1926-4E4A-B7B2-7FF7C90A9458}"/>
-          </ac:spMkLst>
-        </pc:spChg>
-        <pc:graphicFrameChg chg="mod modGraphic">
-          <ac:chgData name="Shrivats Agrawal" userId="e5df348812f7d361" providerId="LiveId" clId="{2B6C14F9-B8D7-43B3-A9F9-F9BF1904CE9F}" dt="2021-12-12T16:15:04.840" v="1116" actId="1076"/>
-          <ac:graphicFrameMkLst>
-            <pc:docMk/>
-            <pc:sldMk cId="3466991620" sldId="274"/>
-            <ac:graphicFrameMk id="4" creationId="{154EFBEC-3CBC-9A44-9441-CAF39AFA6876}"/>
-          </ac:graphicFrameMkLst>
-        </pc:graphicFrameChg>
-      </pc:sldChg>
-      <pc:sldChg chg="modSp new del mod">
-        <pc:chgData name="Shrivats Agrawal" userId="e5df348812f7d361" providerId="LiveId" clId="{2B6C14F9-B8D7-43B3-A9F9-F9BF1904CE9F}" dt="2021-12-12T15:43:58.901" v="643" actId="680"/>
-        <pc:sldMkLst>
-          <pc:docMk/>
-          <pc:sldMk cId="2182637841" sldId="275"/>
-        </pc:sldMkLst>
-        <pc:spChg chg="mod">
-          <ac:chgData name="Shrivats Agrawal" userId="e5df348812f7d361" providerId="LiveId" clId="{2B6C14F9-B8D7-43B3-A9F9-F9BF1904CE9F}" dt="2021-12-12T15:43:57.139" v="642"/>
-          <ac:spMkLst>
-            <pc:docMk/>
-            <pc:sldMk cId="2182637841" sldId="275"/>
-            <ac:spMk id="3" creationId="{D3932CC4-3A52-4217-A978-0E476E5D04E1}"/>
-          </ac:spMkLst>
-        </pc:spChg>
-      </pc:sldChg>
-      <pc:sldChg chg="addSp delSp modSp new mod">
-        <pc:chgData name="Shrivats Agrawal" userId="e5df348812f7d361" providerId="LiveId" clId="{2B6C14F9-B8D7-43B3-A9F9-F9BF1904CE9F}" dt="2021-12-12T16:15:46.026" v="1130" actId="1076"/>
-        <pc:sldMkLst>
-          <pc:docMk/>
-          <pc:sldMk cId="3111352427" sldId="275"/>
-        </pc:sldMkLst>
-        <pc:spChg chg="mod">
-          <ac:chgData name="Shrivats Agrawal" userId="e5df348812f7d361" providerId="LiveId" clId="{2B6C14F9-B8D7-43B3-A9F9-F9BF1904CE9F}" dt="2021-12-12T16:08:47.693" v="962"/>
-          <ac:spMkLst>
-            <pc:docMk/>
-            <pc:sldMk cId="3111352427" sldId="275"/>
-            <ac:spMk id="2" creationId="{ABF2F55E-459A-45CB-BB52-FCF409E0F932}"/>
-          </ac:spMkLst>
-        </pc:spChg>
-        <pc:spChg chg="del">
-          <ac:chgData name="Shrivats Agrawal" userId="e5df348812f7d361" providerId="LiveId" clId="{2B6C14F9-B8D7-43B3-A9F9-F9BF1904CE9F}" dt="2021-12-12T15:44:53.376" v="668" actId="22"/>
-          <ac:spMkLst>
-            <pc:docMk/>
-            <pc:sldMk cId="3111352427" sldId="275"/>
-            <ac:spMk id="3" creationId="{1D07AC9E-4CC3-4639-8B04-AC6BB9DB412D}"/>
-          </ac:spMkLst>
-        </pc:spChg>
-        <pc:spChg chg="add del mod">
-          <ac:chgData name="Shrivats Agrawal" userId="e5df348812f7d361" providerId="LiveId" clId="{2B6C14F9-B8D7-43B3-A9F9-F9BF1904CE9F}" dt="2021-12-12T15:47:05.633" v="681"/>
-          <ac:spMkLst>
-            <pc:docMk/>
-            <pc:sldMk cId="3111352427" sldId="275"/>
-            <ac:spMk id="8" creationId="{478227FE-A32C-47F1-B914-AB5B300FF856}"/>
-          </ac:spMkLst>
-        </pc:spChg>
-        <pc:graphicFrameChg chg="add del mod">
-          <ac:chgData name="Shrivats Agrawal" userId="e5df348812f7d361" providerId="LiveId" clId="{2B6C14F9-B8D7-43B3-A9F9-F9BF1904CE9F}" dt="2021-12-12T15:46:39.520" v="677"/>
-          <ac:graphicFrameMkLst>
-            <pc:docMk/>
-            <pc:sldMk cId="3111352427" sldId="275"/>
-            <ac:graphicFrameMk id="6" creationId="{C6FE5E07-ACDD-4762-8642-362B79E682C4}"/>
-          </ac:graphicFrameMkLst>
-        </pc:graphicFrameChg>
-        <pc:graphicFrameChg chg="add del mod">
-          <ac:chgData name="Shrivats Agrawal" userId="e5df348812f7d361" providerId="LiveId" clId="{2B6C14F9-B8D7-43B3-A9F9-F9BF1904CE9F}" dt="2021-12-12T15:46:52.808" v="680"/>
-          <ac:graphicFrameMkLst>
-            <pc:docMk/>
-            <pc:sldMk cId="3111352427" sldId="275"/>
-            <ac:graphicFrameMk id="9" creationId="{04F86C39-B506-4194-BD0F-27D1FCAA4777}"/>
-          </ac:graphicFrameMkLst>
-        </pc:graphicFrameChg>
-        <pc:graphicFrameChg chg="add mod modGraphic">
-          <ac:chgData name="Shrivats Agrawal" userId="e5df348812f7d361" providerId="LiveId" clId="{2B6C14F9-B8D7-43B3-A9F9-F9BF1904CE9F}" dt="2021-12-12T16:15:46.026" v="1130" actId="1076"/>
-          <ac:graphicFrameMkLst>
-            <pc:docMk/>
-            <pc:sldMk cId="3111352427" sldId="275"/>
-            <ac:graphicFrameMk id="10" creationId="{E765816B-83FF-4D5A-919A-52D90FB9D1AB}"/>
-          </ac:graphicFrameMkLst>
-        </pc:graphicFrameChg>
-        <pc:picChg chg="add del mod ord">
-          <ac:chgData name="Shrivats Agrawal" userId="e5df348812f7d361" providerId="LiveId" clId="{2B6C14F9-B8D7-43B3-A9F9-F9BF1904CE9F}" dt="2021-12-12T15:46:41.344" v="678" actId="478"/>
-          <ac:picMkLst>
-            <pc:docMk/>
-            <pc:sldMk cId="3111352427" sldId="275"/>
-            <ac:picMk id="5" creationId="{8E6E354D-90F0-4C64-9744-46C95090797B}"/>
-          </ac:picMkLst>
-        </pc:picChg>
-      </pc:sldChg>
-      <pc:sldChg chg="addSp modSp del mod">
-        <pc:chgData name="Shrivats Agrawal" userId="e5df348812f7d361" providerId="LiveId" clId="{2B6C14F9-B8D7-43B3-A9F9-F9BF1904CE9F}" dt="2021-12-12T15:55:37.483" v="938" actId="1076"/>
-        <pc:sldMkLst>
-          <pc:docMk/>
-          <pc:sldMk cId="0" sldId="276"/>
-        </pc:sldMkLst>
-        <pc:spChg chg="add mod">
-          <ac:chgData name="Shrivats Agrawal" userId="e5df348812f7d361" providerId="LiveId" clId="{2B6C14F9-B8D7-43B3-A9F9-F9BF1904CE9F}" dt="2021-12-12T15:55:37.483" v="938" actId="1076"/>
-          <ac:spMkLst>
-            <pc:docMk/>
-            <pc:sldMk cId="0" sldId="276"/>
-            <ac:spMk id="2" creationId="{E3A3546B-3846-428F-8378-CA7827DE892C}"/>
-          </ac:spMkLst>
-        </pc:spChg>
-        <pc:spChg chg="mod">
-          <ac:chgData name="Shrivats Agrawal" userId="e5df348812f7d361" providerId="LiveId" clId="{2B6C14F9-B8D7-43B3-A9F9-F9BF1904CE9F}" dt="2021-12-12T15:52:40.053" v="739" actId="20577"/>
-          <ac:spMkLst>
-            <pc:docMk/>
-            <pc:sldMk cId="0" sldId="276"/>
-            <ac:spMk id="211" creationId="{00000000-0000-0000-0000-000000000000}"/>
-          </ac:spMkLst>
-        </pc:spChg>
-        <pc:spChg chg="mod">
-          <ac:chgData name="Shrivats Agrawal" userId="e5df348812f7d361" providerId="LiveId" clId="{2B6C14F9-B8D7-43B3-A9F9-F9BF1904CE9F}" dt="2021-12-12T15:54:38.703" v="916" actId="20577"/>
-          <ac:spMkLst>
-            <pc:docMk/>
-            <pc:sldMk cId="0" sldId="276"/>
-            <ac:spMk id="212" creationId="{00000000-0000-0000-0000-000000000000}"/>
-          </ac:spMkLst>
-        </pc:spChg>
-        <pc:spChg chg="mod">
-          <ac:chgData name="Shrivats Agrawal" userId="e5df348812f7d361" providerId="LiveId" clId="{2B6C14F9-B8D7-43B3-A9F9-F9BF1904CE9F}" dt="2021-12-12T15:52:54.253" v="755" actId="1076"/>
-          <ac:spMkLst>
-            <pc:docMk/>
-            <pc:sldMk cId="0" sldId="276"/>
-            <ac:spMk id="213" creationId="{00000000-0000-0000-0000-000000000000}"/>
-          </ac:spMkLst>
-        </pc:spChg>
-      </pc:sldChg>
-      <pc:sldMasterChg chg="setBg modSldLayout">
-        <pc:chgData name="Shrivats Agrawal" userId="e5df348812f7d361" providerId="LiveId" clId="{2B6C14F9-B8D7-43B3-A9F9-F9BF1904CE9F}" dt="2021-12-12T16:09:46.876" v="970"/>
-        <pc:sldMasterMkLst>
-          <pc:docMk/>
-          <pc:sldMasterMk cId="2637622692" sldId="2147484200"/>
-        </pc:sldMasterMkLst>
-        <pc:sldLayoutChg chg="setBg">
-          <pc:chgData name="Shrivats Agrawal" userId="e5df348812f7d361" providerId="LiveId" clId="{2B6C14F9-B8D7-43B3-A9F9-F9BF1904CE9F}" dt="2021-12-12T16:09:46.876" v="970"/>
-          <pc:sldLayoutMkLst>
-            <pc:docMk/>
-            <pc:sldMasterMk cId="2637622692" sldId="2147484200"/>
-            <pc:sldLayoutMk cId="2581439571" sldId="2147484201"/>
-          </pc:sldLayoutMkLst>
-        </pc:sldLayoutChg>
-        <pc:sldLayoutChg chg="setBg">
-          <pc:chgData name="Shrivats Agrawal" userId="e5df348812f7d361" providerId="LiveId" clId="{2B6C14F9-B8D7-43B3-A9F9-F9BF1904CE9F}" dt="2021-12-12T16:09:46.876" v="970"/>
-          <pc:sldLayoutMkLst>
-            <pc:docMk/>
-            <pc:sldMasterMk cId="2637622692" sldId="2147484200"/>
-            <pc:sldLayoutMk cId="3443110581" sldId="2147484202"/>
-          </pc:sldLayoutMkLst>
-        </pc:sldLayoutChg>
-        <pc:sldLayoutChg chg="setBg">
-          <pc:chgData name="Shrivats Agrawal" userId="e5df348812f7d361" providerId="LiveId" clId="{2B6C14F9-B8D7-43B3-A9F9-F9BF1904CE9F}" dt="2021-12-12T16:09:46.876" v="970"/>
-          <pc:sldLayoutMkLst>
-            <pc:docMk/>
-            <pc:sldMasterMk cId="2637622692" sldId="2147484200"/>
-            <pc:sldLayoutMk cId="2917893692" sldId="2147484203"/>
-          </pc:sldLayoutMkLst>
-        </pc:sldLayoutChg>
-        <pc:sldLayoutChg chg="setBg">
-          <pc:chgData name="Shrivats Agrawal" userId="e5df348812f7d361" providerId="LiveId" clId="{2B6C14F9-B8D7-43B3-A9F9-F9BF1904CE9F}" dt="2021-12-12T16:09:46.876" v="970"/>
-          <pc:sldLayoutMkLst>
-            <pc:docMk/>
-            <pc:sldMasterMk cId="2637622692" sldId="2147484200"/>
-            <pc:sldLayoutMk cId="3066904698" sldId="2147484204"/>
-          </pc:sldLayoutMkLst>
-        </pc:sldLayoutChg>
-        <pc:sldLayoutChg chg="setBg">
-          <pc:chgData name="Shrivats Agrawal" userId="e5df348812f7d361" providerId="LiveId" clId="{2B6C14F9-B8D7-43B3-A9F9-F9BF1904CE9F}" dt="2021-12-12T16:09:46.876" v="970"/>
-          <pc:sldLayoutMkLst>
-            <pc:docMk/>
-            <pc:sldMasterMk cId="2637622692" sldId="2147484200"/>
-            <pc:sldLayoutMk cId="2435360294" sldId="2147484205"/>
-          </pc:sldLayoutMkLst>
-        </pc:sldLayoutChg>
-        <pc:sldLayoutChg chg="setBg">
-          <pc:chgData name="Shrivats Agrawal" userId="e5df348812f7d361" providerId="LiveId" clId="{2B6C14F9-B8D7-43B3-A9F9-F9BF1904CE9F}" dt="2021-12-12T16:09:46.876" v="970"/>
-          <pc:sldLayoutMkLst>
-            <pc:docMk/>
-            <pc:sldMasterMk cId="2637622692" sldId="2147484200"/>
-            <pc:sldLayoutMk cId="2208453583" sldId="2147484206"/>
-          </pc:sldLayoutMkLst>
-        </pc:sldLayoutChg>
-        <pc:sldLayoutChg chg="setBg">
-          <pc:chgData name="Shrivats Agrawal" userId="e5df348812f7d361" providerId="LiveId" clId="{2B6C14F9-B8D7-43B3-A9F9-F9BF1904CE9F}" dt="2021-12-12T16:09:46.876" v="970"/>
-          <pc:sldLayoutMkLst>
-            <pc:docMk/>
-            <pc:sldMasterMk cId="2637622692" sldId="2147484200"/>
-            <pc:sldLayoutMk cId="2492719567" sldId="2147484207"/>
-          </pc:sldLayoutMkLst>
-        </pc:sldLayoutChg>
-        <pc:sldLayoutChg chg="setBg">
-          <pc:chgData name="Shrivats Agrawal" userId="e5df348812f7d361" providerId="LiveId" clId="{2B6C14F9-B8D7-43B3-A9F9-F9BF1904CE9F}" dt="2021-12-12T16:09:46.876" v="970"/>
-          <pc:sldLayoutMkLst>
-            <pc:docMk/>
-            <pc:sldMasterMk cId="2637622692" sldId="2147484200"/>
-            <pc:sldLayoutMk cId="425371450" sldId="2147484208"/>
-          </pc:sldLayoutMkLst>
-        </pc:sldLayoutChg>
-        <pc:sldLayoutChg chg="setBg">
-          <pc:chgData name="Shrivats Agrawal" userId="e5df348812f7d361" providerId="LiveId" clId="{2B6C14F9-B8D7-43B3-A9F9-F9BF1904CE9F}" dt="2021-12-12T16:09:46.876" v="970"/>
-          <pc:sldLayoutMkLst>
-            <pc:docMk/>
-            <pc:sldMasterMk cId="2637622692" sldId="2147484200"/>
-            <pc:sldLayoutMk cId="1782128136" sldId="2147484209"/>
-          </pc:sldLayoutMkLst>
-        </pc:sldLayoutChg>
-        <pc:sldLayoutChg chg="setBg">
-          <pc:chgData name="Shrivats Agrawal" userId="e5df348812f7d361" providerId="LiveId" clId="{2B6C14F9-B8D7-43B3-A9F9-F9BF1904CE9F}" dt="2021-12-12T16:09:46.876" v="970"/>
-          <pc:sldLayoutMkLst>
-            <pc:docMk/>
-            <pc:sldMasterMk cId="2637622692" sldId="2147484200"/>
-            <pc:sldLayoutMk cId="720196555" sldId="2147484210"/>
-          </pc:sldLayoutMkLst>
-        </pc:sldLayoutChg>
-        <pc:sldLayoutChg chg="setBg">
-          <pc:chgData name="Shrivats Agrawal" userId="e5df348812f7d361" providerId="LiveId" clId="{2B6C14F9-B8D7-43B3-A9F9-F9BF1904CE9F}" dt="2021-12-12T16:09:46.876" v="970"/>
-          <pc:sldLayoutMkLst>
-            <pc:docMk/>
-            <pc:sldMasterMk cId="2637622692" sldId="2147484200"/>
-            <pc:sldLayoutMk cId="1500221139" sldId="2147484211"/>
-          </pc:sldLayoutMkLst>
-        </pc:sldLayoutChg>
-        <pc:sldLayoutChg chg="setBg">
-          <pc:chgData name="Shrivats Agrawal" userId="e5df348812f7d361" providerId="LiveId" clId="{2B6C14F9-B8D7-43B3-A9F9-F9BF1904CE9F}" dt="2021-12-12T16:09:46.876" v="970"/>
-          <pc:sldLayoutMkLst>
-            <pc:docMk/>
-            <pc:sldMasterMk cId="2637622692" sldId="2147484200"/>
-            <pc:sldLayoutMk cId="3754470610" sldId="2147484212"/>
-          </pc:sldLayoutMkLst>
-        </pc:sldLayoutChg>
-        <pc:sldLayoutChg chg="setBg">
-          <pc:chgData name="Shrivats Agrawal" userId="e5df348812f7d361" providerId="LiveId" clId="{2B6C14F9-B8D7-43B3-A9F9-F9BF1904CE9F}" dt="2021-12-12T16:09:46.876" v="970"/>
-          <pc:sldLayoutMkLst>
-            <pc:docMk/>
-            <pc:sldMasterMk cId="2637622692" sldId="2147484200"/>
-            <pc:sldLayoutMk cId="3370103311" sldId="2147484213"/>
-          </pc:sldLayoutMkLst>
-        </pc:sldLayoutChg>
-        <pc:sldLayoutChg chg="setBg">
-          <pc:chgData name="Shrivats Agrawal" userId="e5df348812f7d361" providerId="LiveId" clId="{2B6C14F9-B8D7-43B3-A9F9-F9BF1904CE9F}" dt="2021-12-12T16:09:46.876" v="970"/>
-          <pc:sldLayoutMkLst>
-            <pc:docMk/>
-            <pc:sldMasterMk cId="2637622692" sldId="2147484200"/>
-            <pc:sldLayoutMk cId="3969672227" sldId="2147484214"/>
-          </pc:sldLayoutMkLst>
-        </pc:sldLayoutChg>
-        <pc:sldLayoutChg chg="setBg">
-          <pc:chgData name="Shrivats Agrawal" userId="e5df348812f7d361" providerId="LiveId" clId="{2B6C14F9-B8D7-43B3-A9F9-F9BF1904CE9F}" dt="2021-12-12T16:09:46.876" v="970"/>
-          <pc:sldLayoutMkLst>
-            <pc:docMk/>
-            <pc:sldMasterMk cId="2637622692" sldId="2147484200"/>
-            <pc:sldLayoutMk cId="1217993287" sldId="2147484215"/>
-          </pc:sldLayoutMkLst>
-        </pc:sldLayoutChg>
-        <pc:sldLayoutChg chg="setBg">
-          <pc:chgData name="Shrivats Agrawal" userId="e5df348812f7d361" providerId="LiveId" clId="{2B6C14F9-B8D7-43B3-A9F9-F9BF1904CE9F}" dt="2021-12-12T16:09:46.876" v="970"/>
-          <pc:sldLayoutMkLst>
-            <pc:docMk/>
-            <pc:sldMasterMk cId="2637622692" sldId="2147484200"/>
-            <pc:sldLayoutMk cId="2348949525" sldId="2147484216"/>
-          </pc:sldLayoutMkLst>
-        </pc:sldLayoutChg>
-        <pc:sldLayoutChg chg="setBg">
-          <pc:chgData name="Shrivats Agrawal" userId="e5df348812f7d361" providerId="LiveId" clId="{2B6C14F9-B8D7-43B3-A9F9-F9BF1904CE9F}" dt="2021-12-12T16:09:46.876" v="970"/>
-          <pc:sldLayoutMkLst>
-            <pc:docMk/>
-            <pc:sldMasterMk cId="2637622692" sldId="2147484200"/>
-            <pc:sldLayoutMk cId="1616303430" sldId="2147484217"/>
-          </pc:sldLayoutMkLst>
-        </pc:sldLayoutChg>
-      </pc:sldMasterChg>
-      <pc:sldMasterChg chg="modSldLayout">
-        <pc:chgData name="Shrivats Agrawal" userId="e5df348812f7d361" providerId="LiveId" clId="{2B6C14F9-B8D7-43B3-A9F9-F9BF1904CE9F}" dt="2021-12-12T16:08:38.971" v="956"/>
-        <pc:sldMasterMkLst>
-          <pc:docMk/>
-          <pc:sldMasterMk cId="2946238380" sldId="2147484218"/>
-        </pc:sldMasterMkLst>
-        <pc:sldLayoutChg chg="addSp delSp">
-          <pc:chgData name="Shrivats Agrawal" userId="e5df348812f7d361" providerId="LiveId" clId="{2B6C14F9-B8D7-43B3-A9F9-F9BF1904CE9F}" dt="2021-12-12T16:08:38.971" v="956"/>
-          <pc:sldLayoutMkLst>
-            <pc:docMk/>
-            <pc:sldMasterMk cId="2946238380" sldId="2147484218"/>
-            <pc:sldLayoutMk cId="2479990430" sldId="2147484230"/>
-          </pc:sldLayoutMkLst>
-          <pc:spChg chg="add del">
-            <ac:chgData name="Shrivats Agrawal" userId="e5df348812f7d361" providerId="LiveId" clId="{2B6C14F9-B8D7-43B3-A9F9-F9BF1904CE9F}" dt="2021-12-12T16:08:38.971" v="956"/>
-            <ac:spMkLst>
-              <pc:docMk/>
-              <pc:sldMasterMk cId="2946238380" sldId="2147484218"/>
-              <pc:sldLayoutMk cId="2479990430" sldId="2147484230"/>
-              <ac:spMk id="16" creationId="{00000000-0000-0000-0000-000000000000}"/>
-            </ac:spMkLst>
-          </pc:spChg>
-          <pc:grpChg chg="add del">
-            <ac:chgData name="Shrivats Agrawal" userId="e5df348812f7d361" providerId="LiveId" clId="{2B6C14F9-B8D7-43B3-A9F9-F9BF1904CE9F}" dt="2021-12-12T16:08:38.971" v="956"/>
-            <ac:grpSpMkLst>
-              <pc:docMk/>
-              <pc:sldMasterMk cId="2946238380" sldId="2147484218"/>
-              <pc:sldLayoutMk cId="2479990430" sldId="2147484230"/>
-              <ac:grpSpMk id="21" creationId="{00000000-0000-0000-0000-000000000000}"/>
-            </ac:grpSpMkLst>
-          </pc:grpChg>
-          <pc:picChg chg="add del">
-            <ac:chgData name="Shrivats Agrawal" userId="e5df348812f7d361" providerId="LiveId" clId="{2B6C14F9-B8D7-43B3-A9F9-F9BF1904CE9F}" dt="2021-12-12T16:08:38.971" v="956"/>
-            <ac:picMkLst>
-              <pc:docMk/>
-              <pc:sldMasterMk cId="2946238380" sldId="2147484218"/>
-              <pc:sldLayoutMk cId="2479990430" sldId="2147484230"/>
-              <ac:picMk id="17" creationId="{00000000-0000-0000-0000-000000000000}"/>
-            </ac:picMkLst>
-          </pc:picChg>
-          <pc:picChg chg="add del">
-            <ac:chgData name="Shrivats Agrawal" userId="e5df348812f7d361" providerId="LiveId" clId="{2B6C14F9-B8D7-43B3-A9F9-F9BF1904CE9F}" dt="2021-12-12T16:08:38.971" v="956"/>
-            <ac:picMkLst>
-              <pc:docMk/>
-              <pc:sldMasterMk cId="2946238380" sldId="2147484218"/>
-              <pc:sldLayoutMk cId="2479990430" sldId="2147484230"/>
-              <ac:picMk id="18" creationId="{00000000-0000-0000-0000-000000000000}"/>
-            </ac:picMkLst>
-          </pc:picChg>
-        </pc:sldLayoutChg>
-      </pc:sldMasterChg>
     </pc:docChg>
   </pc:docChgLst>
 </pc:chgInfo>
@@ -19875,6 +19093,135 @@
           <p:cNvPr id="2" name="Title 1">
             <a:extLst>
               <a:ext uri="{FF2B5EF4-FFF2-40B4-BE49-F238E27FC236}">
+                <a16:creationId xmlns:a16="http://schemas.microsoft.com/office/drawing/2014/main" id="{D7F2293B-D356-D445-A008-98E6F5C527FB}"/>
+              </a:ext>
+            </a:extLst>
+          </p:cNvPr>
+          <p:cNvSpPr>
+            <a:spLocks noGrp="1"/>
+          </p:cNvSpPr>
+          <p:nvPr>
+            <p:ph type="title"/>
+          </p:nvPr>
+        </p:nvSpPr>
+        <p:spPr/>
+        <p:txBody>
+          <a:bodyPr/>
+          <a:lstStyle/>
+          <a:p>
+            <a:r>
+              <a:rPr lang="en-US" dirty="0"/>
+              <a:t>Normalization</a:t>
+            </a:r>
+          </a:p>
+        </p:txBody>
+      </p:sp>
+      <p:sp>
+        <p:nvSpPr>
+          <p:cNvPr id="3" name="Content Placeholder 2">
+            <a:extLst>
+              <a:ext uri="{FF2B5EF4-FFF2-40B4-BE49-F238E27FC236}">
+                <a16:creationId xmlns:a16="http://schemas.microsoft.com/office/drawing/2014/main" id="{66A6AB27-078A-EF46-ADD8-641E312C61F5}"/>
+              </a:ext>
+            </a:extLst>
+          </p:cNvPr>
+          <p:cNvSpPr>
+            <a:spLocks noGrp="1"/>
+          </p:cNvSpPr>
+          <p:nvPr>
+            <p:ph type="body" idx="1"/>
+          </p:nvPr>
+        </p:nvSpPr>
+        <p:spPr>
+          <a:xfrm>
+            <a:off x="668288" y="1150584"/>
+            <a:ext cx="9753600" cy="4217020"/>
+          </a:xfrm>
+        </p:spPr>
+        <p:txBody>
+          <a:bodyPr/>
+          <a:lstStyle/>
+          <a:p>
+            <a:r>
+              <a:rPr lang="en-US" dirty="0"/>
+              <a:t>1NF-  every attribute in each relation in the dataset is a </a:t>
+            </a:r>
+            <a:r>
+              <a:rPr lang="en-US" b="1" dirty="0"/>
+              <a:t>singled valued attribute</a:t>
+            </a:r>
+            <a:r>
+              <a:rPr lang="en-US" dirty="0"/>
+              <a:t>. Our Peers table had multi-valued attributes which we normalized to single valued attributes.</a:t>
+            </a:r>
+          </a:p>
+          <a:p>
+            <a:r>
+              <a:rPr lang="en-US" dirty="0"/>
+              <a:t>2NF- we removed subsets of data that applied to multiple rows and created separate tables and formed relationships using Foreign Key constraints. Each non-key attribute is functionally dependent on the primary key in each table.</a:t>
+            </a:r>
+          </a:p>
+          <a:p>
+            <a:r>
+              <a:rPr lang="en-US" dirty="0"/>
+              <a:t>3NF, BCNF- The relations have no transitive functional dependency and are in BCNF.</a:t>
+            </a:r>
+          </a:p>
+          <a:p>
+            <a:pPr marL="0" indent="0">
+              <a:buNone/>
+            </a:pPr>
+            <a:endParaRPr lang="en-US" dirty="0"/>
+          </a:p>
+          <a:p>
+            <a:endParaRPr lang="en-US" dirty="0"/>
+          </a:p>
+          <a:p>
+            <a:pPr marL="0" indent="0">
+              <a:buNone/>
+            </a:pPr>
+            <a:endParaRPr lang="en-US" dirty="0"/>
+          </a:p>
+          <a:p>
+            <a:endParaRPr lang="en-US" dirty="0"/>
+          </a:p>
+        </p:txBody>
+      </p:sp>
+    </p:spTree>
+    <p:extLst>
+      <p:ext uri="{BB962C8B-B14F-4D97-AF65-F5344CB8AC3E}">
+        <p14:creationId xmlns:p14="http://schemas.microsoft.com/office/powerpoint/2010/main" val="4089964651"/>
+      </p:ext>
+    </p:extLst>
+  </p:cSld>
+  <p:clrMapOvr>
+    <a:masterClrMapping/>
+  </p:clrMapOvr>
+</p:sld>
+</file>
+
+<file path=ppt/slides/slide11.xml><?xml version="1.0" encoding="utf-8"?>
+<p:sld xmlns:a="http://schemas.openxmlformats.org/drawingml/2006/main" xmlns:r="http://schemas.openxmlformats.org/officeDocument/2006/relationships" xmlns:p="http://schemas.openxmlformats.org/presentationml/2006/main">
+  <p:cSld>
+    <p:spTree>
+      <p:nvGrpSpPr>
+        <p:cNvPr id="1" name=""/>
+        <p:cNvGrpSpPr/>
+        <p:nvPr/>
+      </p:nvGrpSpPr>
+      <p:grpSpPr>
+        <a:xfrm>
+          <a:off x="0" y="0"/>
+          <a:ext cx="0" cy="0"/>
+          <a:chOff x="0" y="0"/>
+          <a:chExt cx="0" cy="0"/>
+        </a:xfrm>
+      </p:grpSpPr>
+      <p:sp>
+        <p:nvSpPr>
+          <p:cNvPr id="2" name="Title 1">
+            <a:extLst>
+              <a:ext uri="{FF2B5EF4-FFF2-40B4-BE49-F238E27FC236}">
                 <a16:creationId xmlns:a16="http://schemas.microsoft.com/office/drawing/2014/main" id="{F6AF785F-ECB7-CC4B-A31F-2B88A3F01FA7}"/>
               </a:ext>
             </a:extLst>
@@ -20071,7 +19418,7 @@
 </p:sld>
 </file>
 
-<file path=ppt/slides/slide11.xml><?xml version="1.0" encoding="utf-8"?>
+<file path=ppt/slides/slide12.xml><?xml version="1.0" encoding="utf-8"?>
 <p:sld xmlns:a="http://schemas.openxmlformats.org/drawingml/2006/main" xmlns:r="http://schemas.openxmlformats.org/officeDocument/2006/relationships" xmlns:p="http://schemas.openxmlformats.org/presentationml/2006/main">
   <p:cSld>
     <p:spTree>
@@ -20132,7 +19479,7 @@
             <p:ph idx="4294967295"/>
             <p:extLst>
               <p:ext uri="{D42A27DB-BD31-4B8C-83A1-F6EECF244321}">
-                <p14:modId xmlns:p14="http://schemas.microsoft.com/office/powerpoint/2010/main" val="25257931"/>
+                <p14:modId xmlns:p14="http://schemas.microsoft.com/office/powerpoint/2010/main" val="1167144765"/>
               </p:ext>
             </p:extLst>
           </p:nvPr>
@@ -20195,7 +19542,7 @@
                           </a:solidFill>
                           <a:effectLst/>
                         </a:rPr>
-                        <a:t>Returns the companies which match the user entered parameters like number of employees, number of jobs, market capitalization, sentiment and company Name. This query is utilized by the Home-Page</a:t>
+                        <a:t>Returns the companies which match the user entered parameters like number of employees, number of jobs, market capitalization, sentiment and company Name. This query is utilized by the Home-Page.</a:t>
                       </a:r>
                     </a:p>
                   </a:txBody>
@@ -21130,7 +20477,7 @@
 </p:sld>
 </file>
 
-<file path=ppt/slides/slide12.xml><?xml version="1.0" encoding="utf-8"?>
+<file path=ppt/slides/slide13.xml><?xml version="1.0" encoding="utf-8"?>
 <p:sld xmlns:a="http://schemas.openxmlformats.org/drawingml/2006/main" xmlns:r="http://schemas.openxmlformats.org/officeDocument/2006/relationships" xmlns:p="http://schemas.openxmlformats.org/presentationml/2006/main">
   <p:cSld>
     <p:spTree>
@@ -21964,7 +21311,7 @@
 </p:sld>
 </file>
 
-<file path=ppt/slides/slide13.xml><?xml version="1.0" encoding="utf-8"?>
+<file path=ppt/slides/slide14.xml><?xml version="1.0" encoding="utf-8"?>
 <p:sld xmlns:a="http://schemas.openxmlformats.org/drawingml/2006/main" xmlns:r="http://schemas.openxmlformats.org/officeDocument/2006/relationships" xmlns:p="http://schemas.openxmlformats.org/presentationml/2006/main">
   <p:cSld>
     <p:spTree>
@@ -22595,7 +21942,7 @@
 </p:sld>
 </file>
 
-<file path=ppt/slides/slide14.xml><?xml version="1.0" encoding="utf-8"?>
+<file path=ppt/slides/slide15.xml><?xml version="1.0" encoding="utf-8"?>
 <p:sld xmlns:a="http://schemas.openxmlformats.org/drawingml/2006/main" xmlns:r="http://schemas.openxmlformats.org/officeDocument/2006/relationships" xmlns:p="http://schemas.openxmlformats.org/presentationml/2006/main">
   <p:cSld>
     <p:spTree>
@@ -23565,7 +22912,7 @@
 </p:sld>
 </file>
 
-<file path=ppt/slides/slide15.xml><?xml version="1.0" encoding="utf-8"?>
+<file path=ppt/slides/slide16.xml><?xml version="1.0" encoding="utf-8"?>
 <p:sld xmlns:a="http://schemas.openxmlformats.org/drawingml/2006/main" xmlns:r="http://schemas.openxmlformats.org/officeDocument/2006/relationships" xmlns:p="http://schemas.openxmlformats.org/presentationml/2006/main">
   <p:cSld>
     <p:spTree>
@@ -24562,7 +23909,7 @@
 </p:sld>
 </file>
 
-<file path=ppt/slides/slide16.xml><?xml version="1.0" encoding="utf-8"?>
+<file path=ppt/slides/slide17.xml><?xml version="1.0" encoding="utf-8"?>
 <p:sld xmlns:a="http://schemas.openxmlformats.org/drawingml/2006/main" xmlns:r="http://schemas.openxmlformats.org/officeDocument/2006/relationships" xmlns:p="http://schemas.openxmlformats.org/presentationml/2006/main">
   <p:cSld>
     <p:spTree>
@@ -25001,7 +24348,7 @@
 </p:sld>
 </file>
 
-<file path=ppt/slides/slide17.xml><?xml version="1.0" encoding="utf-8"?>
+<file path=ppt/slides/slide18.xml><?xml version="1.0" encoding="utf-8"?>
 <p:sld xmlns:a="http://schemas.openxmlformats.org/drawingml/2006/main" xmlns:r="http://schemas.openxmlformats.org/officeDocument/2006/relationships" xmlns:p="http://schemas.openxmlformats.org/presentationml/2006/main">
   <p:cSld>
     <p:spTree>
@@ -25151,7 +24498,7 @@
 </p:sld>
 </file>
 
-<file path=ppt/slides/slide18.xml><?xml version="1.0" encoding="utf-8"?>
+<file path=ppt/slides/slide19.xml><?xml version="1.0" encoding="utf-8"?>
 <p:sld xmlns:a="http://schemas.openxmlformats.org/drawingml/2006/main" xmlns:r="http://schemas.openxmlformats.org/officeDocument/2006/relationships" xmlns:p="http://schemas.openxmlformats.org/presentationml/2006/main">
   <p:cSld>
     <p:spTree>
@@ -25240,101 +24587,6 @@
     <p:extLst>
       <p:ext uri="{BB962C8B-B14F-4D97-AF65-F5344CB8AC3E}">
         <p14:creationId xmlns:p14="http://schemas.microsoft.com/office/powerpoint/2010/main" val="2302678304"/>
-      </p:ext>
-    </p:extLst>
-  </p:cSld>
-  <p:clrMapOvr>
-    <a:masterClrMapping/>
-  </p:clrMapOvr>
-</p:sld>
-</file>
-
-<file path=ppt/slides/slide19.xml><?xml version="1.0" encoding="utf-8"?>
-<p:sld xmlns:a="http://schemas.openxmlformats.org/drawingml/2006/main" xmlns:r="http://schemas.openxmlformats.org/officeDocument/2006/relationships" xmlns:p="http://schemas.openxmlformats.org/presentationml/2006/main">
-  <p:cSld>
-    <p:spTree>
-      <p:nvGrpSpPr>
-        <p:cNvPr id="1" name=""/>
-        <p:cNvGrpSpPr/>
-        <p:nvPr/>
-      </p:nvGrpSpPr>
-      <p:grpSpPr>
-        <a:xfrm>
-          <a:off x="0" y="0"/>
-          <a:ext cx="0" cy="0"/>
-          <a:chOff x="0" y="0"/>
-          <a:chExt cx="0" cy="0"/>
-        </a:xfrm>
-      </p:grpSpPr>
-      <p:pic>
-        <p:nvPicPr>
-          <p:cNvPr id="5" name="Picture 4" descr="Target with various rings of accuracy">
-            <a:extLst>
-              <a:ext uri="{FF2B5EF4-FFF2-40B4-BE49-F238E27FC236}">
-                <a16:creationId xmlns:a16="http://schemas.microsoft.com/office/drawing/2014/main" id="{D162FC93-6BE2-4C84-B552-0332882F68B0}"/>
-              </a:ext>
-            </a:extLst>
-          </p:cNvPr>
-          <p:cNvPicPr>
-            <a:picLocks noChangeAspect="1"/>
-          </p:cNvPicPr>
-          <p:nvPr/>
-        </p:nvPicPr>
-        <p:blipFill rotWithShape="1">
-          <a:blip r:embed="rId2"/>
-          <a:srcRect t="280" b="15434"/>
-          <a:stretch/>
-        </p:blipFill>
-        <p:spPr>
-          <a:xfrm>
-            <a:off x="20" y="10"/>
-            <a:ext cx="12191980" cy="6859300"/>
-          </a:xfrm>
-          <a:prstGeom prst="rect">
-            <a:avLst/>
-          </a:prstGeom>
-        </p:spPr>
-      </p:pic>
-      <p:sp>
-        <p:nvSpPr>
-          <p:cNvPr id="2" name="Title 1">
-            <a:extLst>
-              <a:ext uri="{FF2B5EF4-FFF2-40B4-BE49-F238E27FC236}">
-                <a16:creationId xmlns:a16="http://schemas.microsoft.com/office/drawing/2014/main" id="{39332F25-5747-6C43-9DB8-5B6E9FB07973}"/>
-              </a:ext>
-            </a:extLst>
-          </p:cNvPr>
-          <p:cNvSpPr>
-            <a:spLocks noGrp="1"/>
-          </p:cNvSpPr>
-          <p:nvPr>
-            <p:ph type="title"/>
-          </p:nvPr>
-        </p:nvSpPr>
-        <p:spPr>
-          <a:xfrm>
-            <a:off x="1915128" y="1788454"/>
-            <a:ext cx="8361229" cy="2098226"/>
-          </a:xfrm>
-        </p:spPr>
-        <p:txBody>
-          <a:bodyPr vert="horz" lIns="91440" tIns="45720" rIns="91440" bIns="45720" rtlCol="0" anchor="b">
-            <a:normAutofit/>
-          </a:bodyPr>
-          <a:lstStyle/>
-          <a:p>
-            <a:pPr algn="ctr"/>
-            <a:r>
-              <a:rPr lang="en-US" sz="7200" cap="all" dirty="0"/>
-              <a:t>DEMO</a:t>
-            </a:r>
-          </a:p>
-        </p:txBody>
-      </p:sp>
-    </p:spTree>
-    <p:extLst>
-      <p:ext uri="{BB962C8B-B14F-4D97-AF65-F5344CB8AC3E}">
-        <p14:creationId xmlns:p14="http://schemas.microsoft.com/office/powerpoint/2010/main" val="2854166306"/>
       </p:ext>
     </p:extLst>
   </p:cSld>
@@ -25445,6 +24697,101 @@
 </p:sld>
 </file>
 
+<file path=ppt/slides/slide20.xml><?xml version="1.0" encoding="utf-8"?>
+<p:sld xmlns:a="http://schemas.openxmlformats.org/drawingml/2006/main" xmlns:r="http://schemas.openxmlformats.org/officeDocument/2006/relationships" xmlns:p="http://schemas.openxmlformats.org/presentationml/2006/main">
+  <p:cSld>
+    <p:spTree>
+      <p:nvGrpSpPr>
+        <p:cNvPr id="1" name=""/>
+        <p:cNvGrpSpPr/>
+        <p:nvPr/>
+      </p:nvGrpSpPr>
+      <p:grpSpPr>
+        <a:xfrm>
+          <a:off x="0" y="0"/>
+          <a:ext cx="0" cy="0"/>
+          <a:chOff x="0" y="0"/>
+          <a:chExt cx="0" cy="0"/>
+        </a:xfrm>
+      </p:grpSpPr>
+      <p:pic>
+        <p:nvPicPr>
+          <p:cNvPr id="5" name="Picture 4" descr="Target with various rings of accuracy">
+            <a:extLst>
+              <a:ext uri="{FF2B5EF4-FFF2-40B4-BE49-F238E27FC236}">
+                <a16:creationId xmlns:a16="http://schemas.microsoft.com/office/drawing/2014/main" id="{D162FC93-6BE2-4C84-B552-0332882F68B0}"/>
+              </a:ext>
+            </a:extLst>
+          </p:cNvPr>
+          <p:cNvPicPr>
+            <a:picLocks noChangeAspect="1"/>
+          </p:cNvPicPr>
+          <p:nvPr/>
+        </p:nvPicPr>
+        <p:blipFill rotWithShape="1">
+          <a:blip r:embed="rId2"/>
+          <a:srcRect t="280" b="15434"/>
+          <a:stretch/>
+        </p:blipFill>
+        <p:spPr>
+          <a:xfrm>
+            <a:off x="20" y="10"/>
+            <a:ext cx="12191980" cy="6859300"/>
+          </a:xfrm>
+          <a:prstGeom prst="rect">
+            <a:avLst/>
+          </a:prstGeom>
+        </p:spPr>
+      </p:pic>
+      <p:sp>
+        <p:nvSpPr>
+          <p:cNvPr id="2" name="Title 1">
+            <a:extLst>
+              <a:ext uri="{FF2B5EF4-FFF2-40B4-BE49-F238E27FC236}">
+                <a16:creationId xmlns:a16="http://schemas.microsoft.com/office/drawing/2014/main" id="{39332F25-5747-6C43-9DB8-5B6E9FB07973}"/>
+              </a:ext>
+            </a:extLst>
+          </p:cNvPr>
+          <p:cNvSpPr>
+            <a:spLocks noGrp="1"/>
+          </p:cNvSpPr>
+          <p:nvPr>
+            <p:ph type="title"/>
+          </p:nvPr>
+        </p:nvSpPr>
+        <p:spPr>
+          <a:xfrm>
+            <a:off x="1915128" y="1788454"/>
+            <a:ext cx="8361229" cy="2098226"/>
+          </a:xfrm>
+        </p:spPr>
+        <p:txBody>
+          <a:bodyPr vert="horz" lIns="91440" tIns="45720" rIns="91440" bIns="45720" rtlCol="0" anchor="b">
+            <a:normAutofit/>
+          </a:bodyPr>
+          <a:lstStyle/>
+          <a:p>
+            <a:pPr algn="ctr"/>
+            <a:r>
+              <a:rPr lang="en-US" sz="7200" cap="all" dirty="0"/>
+              <a:t>DEMO</a:t>
+            </a:r>
+          </a:p>
+        </p:txBody>
+      </p:sp>
+    </p:spTree>
+    <p:extLst>
+      <p:ext uri="{BB962C8B-B14F-4D97-AF65-F5344CB8AC3E}">
+        <p14:creationId xmlns:p14="http://schemas.microsoft.com/office/powerpoint/2010/main" val="2854166306"/>
+      </p:ext>
+    </p:extLst>
+  </p:cSld>
+  <p:clrMapOvr>
+    <a:masterClrMapping/>
+  </p:clrMapOvr>
+</p:sld>
+</file>
+
 <file path=ppt/slides/slide3.xml><?xml version="1.0" encoding="utf-8"?>
 <p:sld xmlns:a="http://schemas.openxmlformats.org/drawingml/2006/main" xmlns:r="http://schemas.openxmlformats.org/officeDocument/2006/relationships" xmlns:p="http://schemas.openxmlformats.org/presentationml/2006/main">
   <p:cSld>
@@ -25490,31 +24837,36 @@
           </a:p>
         </p:txBody>
       </p:sp>
-      <p:sp>
-        <p:nvSpPr>
-          <p:cNvPr id="3" name="Content Placeholder 2">
+      <p:pic>
+        <p:nvPicPr>
+          <p:cNvPr id="6" name="Picture 5">
             <a:extLst>
               <a:ext uri="{FF2B5EF4-FFF2-40B4-BE49-F238E27FC236}">
-                <a16:creationId xmlns:a16="http://schemas.microsoft.com/office/drawing/2014/main" id="{AB64C1AA-6A7F-6C4E-B1B7-A6665F428CFF}"/>
+                <a16:creationId xmlns:a16="http://schemas.microsoft.com/office/drawing/2014/main" id="{36FBEE7E-E19B-4B76-8D15-2A1D01689C5B}"/>
               </a:ext>
             </a:extLst>
           </p:cNvPr>
-          <p:cNvSpPr>
-            <a:spLocks noGrp="1"/>
-          </p:cNvSpPr>
-          <p:nvPr>
-            <p:ph type="body" idx="1"/>
-          </p:nvPr>
-        </p:nvSpPr>
-        <p:spPr/>
-        <p:txBody>
-          <a:bodyPr/>
-          <a:lstStyle/>
-          <a:p>
-            <a:endParaRPr lang="en-US"/>
-          </a:p>
-        </p:txBody>
-      </p:sp>
+          <p:cNvPicPr>
+            <a:picLocks noChangeAspect="1"/>
+          </p:cNvPicPr>
+          <p:nvPr/>
+        </p:nvPicPr>
+        <p:blipFill>
+          <a:blip r:embed="rId2"/>
+          <a:stretch>
+            <a:fillRect/>
+          </a:stretch>
+        </p:blipFill>
+        <p:spPr>
+          <a:xfrm>
+            <a:off x="664502" y="1042457"/>
+            <a:ext cx="10243930" cy="5005248"/>
+          </a:xfrm>
+          <a:prstGeom prst="rect">
+            <a:avLst/>
+          </a:prstGeom>
+        </p:spPr>
+      </p:pic>
     </p:spTree>
     <p:extLst>
       <p:ext uri="{BB962C8B-B14F-4D97-AF65-F5344CB8AC3E}">
@@ -25633,7 +24985,7 @@
                   <a:schemeClr val="tx1"/>
                 </a:solidFill>
               </a:rPr>
-              <a:t>Dataset 1- Financial Modelling Prep (FMP) </a:t>
+              <a:t>Dataset 1- Indeed (Scrapping the data) </a:t>
             </a:r>
           </a:p>
           <a:p>
@@ -25647,14 +24999,8 @@
                   <a:schemeClr val="tx1"/>
                 </a:solidFill>
               </a:rPr>
-              <a:t>Dataset 2- Indeed (Scrapping the data) </a:t>
+              <a:t>Dataset 2- Financial Modelling Prep (FMP) </a:t>
             </a:r>
-          </a:p>
-          <a:p>
-            <a:pPr>
-              <a:buFont typeface="Wingdings" pitchFamily="2" charset="2"/>
-              <a:buChar char="Ø"/>
-            </a:pPr>
             <a:endParaRPr lang="en-US" sz="1800" b="1" dirty="0">
               <a:solidFill>
                 <a:schemeClr val="lt1"/>
@@ -25687,109 +25033,6 @@
 </file>
 
 <file path=ppt/slides/slide5.xml><?xml version="1.0" encoding="utf-8"?>
-<p:sld xmlns:a="http://schemas.openxmlformats.org/drawingml/2006/main" xmlns:r="http://schemas.openxmlformats.org/officeDocument/2006/relationships" xmlns:p="http://schemas.openxmlformats.org/presentationml/2006/main">
-  <p:cSld>
-    <p:spTree>
-      <p:nvGrpSpPr>
-        <p:cNvPr id="1" name=""/>
-        <p:cNvGrpSpPr/>
-        <p:nvPr/>
-      </p:nvGrpSpPr>
-      <p:grpSpPr>
-        <a:xfrm>
-          <a:off x="0" y="0"/>
-          <a:ext cx="0" cy="0"/>
-          <a:chOff x="0" y="0"/>
-          <a:chExt cx="0" cy="0"/>
-        </a:xfrm>
-      </p:grpSpPr>
-      <p:sp>
-        <p:nvSpPr>
-          <p:cNvPr id="2" name="Title 1">
-            <a:extLst>
-              <a:ext uri="{FF2B5EF4-FFF2-40B4-BE49-F238E27FC236}">
-                <a16:creationId xmlns:a16="http://schemas.microsoft.com/office/drawing/2014/main" id="{FD470035-A329-954A-ADEE-4C382B535B42}"/>
-              </a:ext>
-            </a:extLst>
-          </p:cNvPr>
-          <p:cNvSpPr>
-            <a:spLocks noGrp="1"/>
-          </p:cNvSpPr>
-          <p:nvPr>
-            <p:ph type="title"/>
-          </p:nvPr>
-        </p:nvSpPr>
-        <p:spPr/>
-        <p:txBody>
-          <a:bodyPr/>
-          <a:lstStyle/>
-          <a:p>
-            <a:r>
-              <a:rPr lang="en-US" b="1" dirty="0">
-                <a:solidFill>
-                  <a:schemeClr val="tx1"/>
-                </a:solidFill>
-              </a:rPr>
-              <a:t>Financial Modelling Prep (FMP)</a:t>
-            </a:r>
-            <a:endParaRPr lang="en-US" dirty="0"/>
-          </a:p>
-        </p:txBody>
-      </p:sp>
-      <p:sp>
-        <p:nvSpPr>
-          <p:cNvPr id="3" name="Content Placeholder 2">
-            <a:extLst>
-              <a:ext uri="{FF2B5EF4-FFF2-40B4-BE49-F238E27FC236}">
-                <a16:creationId xmlns:a16="http://schemas.microsoft.com/office/drawing/2014/main" id="{2B59C355-FE1A-2B48-A736-8E9E10F0077C}"/>
-              </a:ext>
-            </a:extLst>
-          </p:cNvPr>
-          <p:cNvSpPr>
-            <a:spLocks noGrp="1"/>
-          </p:cNvSpPr>
-          <p:nvPr>
-            <p:ph type="body" idx="1"/>
-          </p:nvPr>
-        </p:nvSpPr>
-        <p:spPr/>
-        <p:txBody>
-          <a:bodyPr/>
-          <a:lstStyle/>
-          <a:p>
-            <a:r>
-              <a:rPr lang="en-US" dirty="0"/>
-              <a:t>Provides one of the most comprehensive financial data API. With each update being audited and standardized in real time to ensure consistency in the data. </a:t>
-            </a:r>
-          </a:p>
-          <a:p>
-            <a:r>
-              <a:rPr lang="en-US" dirty="0"/>
-              <a:t>We choose to work with FMP API as it is freely and easily available, while also it is guaranteed to be consistent and accurate. In addition to the raw financial data the FMP API also provides access to a host of other interesting data about companies like what are a company's stock peers (essentially mapping how companies are related to each other) and what are the social sentiment of a company (with data from a host of social media sites like twitter, reddit, etc.). </a:t>
-            </a:r>
-          </a:p>
-          <a:p>
-            <a:pPr marL="0" indent="0">
-              <a:buNone/>
-            </a:pPr>
-            <a:endParaRPr lang="en-US" dirty="0"/>
-          </a:p>
-        </p:txBody>
-      </p:sp>
-    </p:spTree>
-    <p:extLst>
-      <p:ext uri="{BB962C8B-B14F-4D97-AF65-F5344CB8AC3E}">
-        <p14:creationId xmlns:p14="http://schemas.microsoft.com/office/powerpoint/2010/main" val="2020304711"/>
-      </p:ext>
-    </p:extLst>
-  </p:cSld>
-  <p:clrMapOvr>
-    <a:masterClrMapping/>
-  </p:clrMapOvr>
-</p:sld>
-</file>
-
-<file path=ppt/slides/slide6.xml><?xml version="1.0" encoding="utf-8"?>
 <p:sld xmlns:a="http://schemas.openxmlformats.org/drawingml/2006/main" xmlns:r="http://schemas.openxmlformats.org/officeDocument/2006/relationships" xmlns:p="http://schemas.openxmlformats.org/presentationml/2006/main">
   <p:cSld>
     <p:spTree>
@@ -25907,7 +25150,7 @@
 </p:sld>
 </file>
 
-<file path=ppt/slides/slide7.xml><?xml version="1.0" encoding="utf-8"?>
+<file path=ppt/slides/slide6.xml><?xml version="1.0" encoding="utf-8"?>
 <p:sld xmlns:a="http://schemas.openxmlformats.org/drawingml/2006/main" xmlns:r="http://schemas.openxmlformats.org/officeDocument/2006/relationships" xmlns:p="http://schemas.openxmlformats.org/presentationml/2006/main">
   <p:cSld>
     <p:spTree>
@@ -26029,7 +25272,224 @@
 </p:sld>
 </file>
 
+<file path=ppt/slides/slide7.xml><?xml version="1.0" encoding="utf-8"?>
+<p:sld xmlns:a="http://schemas.openxmlformats.org/drawingml/2006/main" xmlns:r="http://schemas.openxmlformats.org/officeDocument/2006/relationships" xmlns:p="http://schemas.openxmlformats.org/presentationml/2006/main">
+  <p:cSld>
+    <p:spTree>
+      <p:nvGrpSpPr>
+        <p:cNvPr id="1" name=""/>
+        <p:cNvGrpSpPr/>
+        <p:nvPr/>
+      </p:nvGrpSpPr>
+      <p:grpSpPr>
+        <a:xfrm>
+          <a:off x="0" y="0"/>
+          <a:ext cx="0" cy="0"/>
+          <a:chOff x="0" y="0"/>
+          <a:chExt cx="0" cy="0"/>
+        </a:xfrm>
+      </p:grpSpPr>
+      <p:sp>
+        <p:nvSpPr>
+          <p:cNvPr id="2" name="Title 1">
+            <a:extLst>
+              <a:ext uri="{FF2B5EF4-FFF2-40B4-BE49-F238E27FC236}">
+                <a16:creationId xmlns:a16="http://schemas.microsoft.com/office/drawing/2014/main" id="{FD470035-A329-954A-ADEE-4C382B535B42}"/>
+              </a:ext>
+            </a:extLst>
+          </p:cNvPr>
+          <p:cNvSpPr>
+            <a:spLocks noGrp="1"/>
+          </p:cNvSpPr>
+          <p:nvPr>
+            <p:ph type="title"/>
+          </p:nvPr>
+        </p:nvSpPr>
+        <p:spPr/>
+        <p:txBody>
+          <a:bodyPr/>
+          <a:lstStyle/>
+          <a:p>
+            <a:r>
+              <a:rPr lang="en-US" b="1" dirty="0">
+                <a:solidFill>
+                  <a:schemeClr val="tx1"/>
+                </a:solidFill>
+              </a:rPr>
+              <a:t>Financial Modelling Prep (FMP)</a:t>
+            </a:r>
+            <a:endParaRPr lang="en-US" dirty="0"/>
+          </a:p>
+        </p:txBody>
+      </p:sp>
+      <p:sp>
+        <p:nvSpPr>
+          <p:cNvPr id="3" name="Content Placeholder 2">
+            <a:extLst>
+              <a:ext uri="{FF2B5EF4-FFF2-40B4-BE49-F238E27FC236}">
+                <a16:creationId xmlns:a16="http://schemas.microsoft.com/office/drawing/2014/main" id="{2B59C355-FE1A-2B48-A736-8E9E10F0077C}"/>
+              </a:ext>
+            </a:extLst>
+          </p:cNvPr>
+          <p:cNvSpPr>
+            <a:spLocks noGrp="1"/>
+          </p:cNvSpPr>
+          <p:nvPr>
+            <p:ph type="body" idx="1"/>
+          </p:nvPr>
+        </p:nvSpPr>
+        <p:spPr/>
+        <p:txBody>
+          <a:bodyPr/>
+          <a:lstStyle/>
+          <a:p>
+            <a:r>
+              <a:rPr lang="en-US" dirty="0"/>
+              <a:t>Provides one of the most comprehensive financial data API. With each update being audited and standardized in real time to ensure consistency in the data. </a:t>
+            </a:r>
+          </a:p>
+          <a:p>
+            <a:r>
+              <a:rPr lang="en-US" dirty="0"/>
+              <a:t>We choose to work with FMP API as it is freely and easily available, while also it is guaranteed to be consistent and accurate. In addition to the raw financial data the FMP API also provides access to a host of other interesting data about companies like what are a company's stock peers (essentially mapping how companies are related to each other) and what are the social sentiment of a company (with data from a host of social media sites like twitter, reddit, etc.). </a:t>
+            </a:r>
+          </a:p>
+          <a:p>
+            <a:pPr marL="0" indent="0">
+              <a:buNone/>
+            </a:pPr>
+            <a:endParaRPr lang="en-US" dirty="0"/>
+          </a:p>
+        </p:txBody>
+      </p:sp>
+    </p:spTree>
+    <p:extLst>
+      <p:ext uri="{BB962C8B-B14F-4D97-AF65-F5344CB8AC3E}">
+        <p14:creationId xmlns:p14="http://schemas.microsoft.com/office/powerpoint/2010/main" val="2020304711"/>
+      </p:ext>
+    </p:extLst>
+  </p:cSld>
+  <p:clrMapOvr>
+    <a:masterClrMapping/>
+  </p:clrMapOvr>
+</p:sld>
+</file>
+
 <file path=ppt/slides/slide8.xml><?xml version="1.0" encoding="utf-8"?>
+<p:sld xmlns:a="http://schemas.openxmlformats.org/drawingml/2006/main" xmlns:r="http://schemas.openxmlformats.org/officeDocument/2006/relationships" xmlns:p="http://schemas.openxmlformats.org/presentationml/2006/main">
+  <p:cSld>
+    <p:spTree>
+      <p:nvGrpSpPr>
+        <p:cNvPr id="1" name=""/>
+        <p:cNvGrpSpPr/>
+        <p:nvPr/>
+      </p:nvGrpSpPr>
+      <p:grpSpPr>
+        <a:xfrm>
+          <a:off x="0" y="0"/>
+          <a:ext cx="0" cy="0"/>
+          <a:chOff x="0" y="0"/>
+          <a:chExt cx="0" cy="0"/>
+        </a:xfrm>
+      </p:grpSpPr>
+      <p:sp>
+        <p:nvSpPr>
+          <p:cNvPr id="2" name="Title 1">
+            <a:extLst>
+              <a:ext uri="{FF2B5EF4-FFF2-40B4-BE49-F238E27FC236}">
+                <a16:creationId xmlns:a16="http://schemas.microsoft.com/office/drawing/2014/main" id="{7028F658-3BA3-EE4F-AEDE-27B760EB142A}"/>
+              </a:ext>
+            </a:extLst>
+          </p:cNvPr>
+          <p:cNvSpPr>
+            <a:spLocks noGrp="1"/>
+          </p:cNvSpPr>
+          <p:nvPr>
+            <p:ph type="title"/>
+          </p:nvPr>
+        </p:nvSpPr>
+        <p:spPr/>
+        <p:txBody>
+          <a:bodyPr/>
+          <a:lstStyle/>
+          <a:p>
+            <a:r>
+              <a:rPr lang="en-US" dirty="0"/>
+              <a:t>Preprocessing</a:t>
+            </a:r>
+          </a:p>
+        </p:txBody>
+      </p:sp>
+      <p:sp>
+        <p:nvSpPr>
+          <p:cNvPr id="3" name="Content Placeholder 2">
+            <a:extLst>
+              <a:ext uri="{FF2B5EF4-FFF2-40B4-BE49-F238E27FC236}">
+                <a16:creationId xmlns:a16="http://schemas.microsoft.com/office/drawing/2014/main" id="{616C6D97-515F-2547-A140-3E9A3901A606}"/>
+              </a:ext>
+            </a:extLst>
+          </p:cNvPr>
+          <p:cNvSpPr>
+            <a:spLocks noGrp="1"/>
+          </p:cNvSpPr>
+          <p:nvPr>
+            <p:ph type="body" idx="1"/>
+          </p:nvPr>
+        </p:nvSpPr>
+        <p:spPr/>
+        <p:txBody>
+          <a:bodyPr/>
+          <a:lstStyle/>
+          <a:p>
+            <a:r>
+              <a:rPr lang="en-US" dirty="0"/>
+              <a:t>FMP:</a:t>
+            </a:r>
+          </a:p>
+          <a:p>
+            <a:pPr lvl="1"/>
+            <a:r>
+              <a:rPr lang="en-US" dirty="0"/>
+              <a:t>Dropped lots of irrelevant columns (for our application) related to stock price statistics to make the tables compact. </a:t>
+            </a:r>
+          </a:p>
+          <a:p>
+            <a:pPr lvl="1"/>
+            <a:r>
+              <a:rPr lang="en-US" dirty="0"/>
+              <a:t>Handled and filtered unexpected characters in company symbols and descriptions, keeping only the ones with proper UTF-8 symbols and names.</a:t>
+            </a:r>
+          </a:p>
+          <a:p>
+            <a:pPr lvl="1"/>
+            <a:r>
+              <a:rPr lang="en-US" dirty="0"/>
+              <a:t>Converted strings fetched from the API to integers or floats as required for specific data columns.</a:t>
+            </a:r>
+          </a:p>
+          <a:p>
+            <a:pPr lvl="1"/>
+            <a:r>
+              <a:rPr lang="en-US" dirty="0"/>
+              <a:t>Expanded over multi-value attributes to ensure atomicity (1 NF).</a:t>
+            </a:r>
+          </a:p>
+        </p:txBody>
+      </p:sp>
+    </p:spTree>
+    <p:extLst>
+      <p:ext uri="{BB962C8B-B14F-4D97-AF65-F5344CB8AC3E}">
+        <p14:creationId xmlns:p14="http://schemas.microsoft.com/office/powerpoint/2010/main" val="4045189360"/>
+      </p:ext>
+    </p:extLst>
+  </p:cSld>
+  <p:clrMapOvr>
+    <a:masterClrMapping/>
+  </p:clrMapOvr>
+</p:sld>
+</file>
+
+<file path=ppt/slides/slide9.xml><?xml version="1.0" encoding="utf-8"?>
 <p:sld xmlns:a="http://schemas.openxmlformats.org/drawingml/2006/main" xmlns:r="http://schemas.openxmlformats.org/officeDocument/2006/relationships" xmlns:p="http://schemas.openxmlformats.org/presentationml/2006/main">
   <p:cSld>
     <p:spTree>
@@ -26142,144 +25602,6 @@
     <p:extLst>
       <p:ext uri="{BB962C8B-B14F-4D97-AF65-F5344CB8AC3E}">
         <p14:creationId xmlns:p14="http://schemas.microsoft.com/office/powerpoint/2010/main" val="1891111787"/>
-      </p:ext>
-    </p:extLst>
-  </p:cSld>
-  <p:clrMapOvr>
-    <a:masterClrMapping/>
-  </p:clrMapOvr>
-</p:sld>
-</file>
-
-<file path=ppt/slides/slide9.xml><?xml version="1.0" encoding="utf-8"?>
-<p:sld xmlns:a="http://schemas.openxmlformats.org/drawingml/2006/main" xmlns:r="http://schemas.openxmlformats.org/officeDocument/2006/relationships" xmlns:p="http://schemas.openxmlformats.org/presentationml/2006/main">
-  <p:cSld>
-    <p:spTree>
-      <p:nvGrpSpPr>
-        <p:cNvPr id="1" name=""/>
-        <p:cNvGrpSpPr/>
-        <p:nvPr/>
-      </p:nvGrpSpPr>
-      <p:grpSpPr>
-        <a:xfrm>
-          <a:off x="0" y="0"/>
-          <a:ext cx="0" cy="0"/>
-          <a:chOff x="0" y="0"/>
-          <a:chExt cx="0" cy="0"/>
-        </a:xfrm>
-      </p:grpSpPr>
-      <p:sp>
-        <p:nvSpPr>
-          <p:cNvPr id="2" name="Title 1">
-            <a:extLst>
-              <a:ext uri="{FF2B5EF4-FFF2-40B4-BE49-F238E27FC236}">
-                <a16:creationId xmlns:a16="http://schemas.microsoft.com/office/drawing/2014/main" id="{D7F2293B-D356-D445-A008-98E6F5C527FB}"/>
-              </a:ext>
-            </a:extLst>
-          </p:cNvPr>
-          <p:cNvSpPr>
-            <a:spLocks noGrp="1"/>
-          </p:cNvSpPr>
-          <p:nvPr>
-            <p:ph type="title"/>
-          </p:nvPr>
-        </p:nvSpPr>
-        <p:spPr/>
-        <p:txBody>
-          <a:bodyPr/>
-          <a:lstStyle/>
-          <a:p>
-            <a:r>
-              <a:rPr lang="en-US" dirty="0"/>
-              <a:t>Normalization</a:t>
-            </a:r>
-          </a:p>
-        </p:txBody>
-      </p:sp>
-      <p:sp>
-        <p:nvSpPr>
-          <p:cNvPr id="3" name="Content Placeholder 2">
-            <a:extLst>
-              <a:ext uri="{FF2B5EF4-FFF2-40B4-BE49-F238E27FC236}">
-                <a16:creationId xmlns:a16="http://schemas.microsoft.com/office/drawing/2014/main" id="{66A6AB27-078A-EF46-ADD8-641E312C61F5}"/>
-              </a:ext>
-            </a:extLst>
-          </p:cNvPr>
-          <p:cNvSpPr>
-            <a:spLocks noGrp="1"/>
-          </p:cNvSpPr>
-          <p:nvPr>
-            <p:ph type="body" idx="1"/>
-          </p:nvPr>
-        </p:nvSpPr>
-        <p:spPr>
-          <a:xfrm>
-            <a:off x="668288" y="1150584"/>
-            <a:ext cx="9753600" cy="4217020"/>
-          </a:xfrm>
-        </p:spPr>
-        <p:txBody>
-          <a:bodyPr/>
-          <a:lstStyle/>
-          <a:p>
-            <a:r>
-              <a:rPr lang="en-US" dirty="0"/>
-              <a:t>1NF-  every attribute in each relation in the dataset is a </a:t>
-            </a:r>
-            <a:r>
-              <a:rPr lang="en-US" b="1" dirty="0"/>
-              <a:t>singled valued attribute</a:t>
-            </a:r>
-            <a:r>
-              <a:rPr lang="en-US" dirty="0"/>
-              <a:t>.</a:t>
-            </a:r>
-          </a:p>
-          <a:p>
-            <a:pPr marL="152396" indent="0">
-              <a:buNone/>
-            </a:pPr>
-            <a:r>
-              <a:rPr lang="en-US" dirty="0"/>
-              <a:t>	Our Peers table had multi-valued attributes which we normalized to single valued attributes.</a:t>
-            </a:r>
-          </a:p>
-          <a:p>
-            <a:r>
-              <a:rPr lang="en-US" dirty="0"/>
-              <a:t>2NF- we removed subsets of data that applied to multiple rows and created separate tables and formed relationships using Foreign Key constraints. Each non-key attribute is functionally dependent on the primary key in each table.</a:t>
-            </a:r>
-          </a:p>
-          <a:p>
-            <a:r>
-              <a:rPr lang="en-US" dirty="0"/>
-              <a:t>3NF, BCNF- The relations have no transitive functional dependency and are in BCNF.</a:t>
-            </a:r>
-          </a:p>
-          <a:p>
-            <a:pPr marL="0" indent="0">
-              <a:buNone/>
-            </a:pPr>
-            <a:endParaRPr lang="en-US" dirty="0"/>
-          </a:p>
-          <a:p>
-            <a:endParaRPr lang="en-US" dirty="0"/>
-          </a:p>
-          <a:p>
-            <a:pPr marL="0" indent="0">
-              <a:buNone/>
-            </a:pPr>
-            <a:endParaRPr lang="en-US" dirty="0"/>
-          </a:p>
-          <a:p>
-            <a:endParaRPr lang="en-US" dirty="0"/>
-          </a:p>
-        </p:txBody>
-      </p:sp>
-    </p:spTree>
-    <p:extLst>
-      <p:ext uri="{BB962C8B-B14F-4D97-AF65-F5344CB8AC3E}">
-        <p14:creationId xmlns:p14="http://schemas.microsoft.com/office/powerpoint/2010/main" val="4089964651"/>
       </p:ext>
     </p:extLst>
   </p:cSld>

</xml_diff>